<commit_message>
Version 1 along with PPT
</commit_message>
<xml_diff>
--- a/Data/INVEST.pptx
+++ b/Data/INVEST.pptx
@@ -5,7 +5,7 @@
     <p:sldMasterId id="2147483660" r:id="rId1"/>
   </p:sldMasterIdLst>
   <p:notesMasterIdLst>
-    <p:notesMasterId r:id="rId12"/>
+    <p:notesMasterId r:id="rId13"/>
   </p:notesMasterIdLst>
   <p:sldIdLst>
     <p:sldId id="256" r:id="rId2"/>
@@ -14,10 +14,11 @@
     <p:sldId id="259" r:id="rId5"/>
     <p:sldId id="260" r:id="rId6"/>
     <p:sldId id="267" r:id="rId7"/>
-    <p:sldId id="262" r:id="rId8"/>
-    <p:sldId id="268" r:id="rId9"/>
-    <p:sldId id="269" r:id="rId10"/>
-    <p:sldId id="265" r:id="rId11"/>
+    <p:sldId id="270" r:id="rId8"/>
+    <p:sldId id="262" r:id="rId9"/>
+    <p:sldId id="268" r:id="rId10"/>
+    <p:sldId id="269" r:id="rId11"/>
+    <p:sldId id="265" r:id="rId12"/>
   </p:sldIdLst>
   <p:sldSz cx="12192000" cy="6858000"/>
   <p:notesSz cx="6858000" cy="9144000"/>
@@ -209,7 +210,7 @@
           <a:p>
             <a:fld id="{2E309023-AF2B-4043-B228-F191CADC9BB1}" type="datetimeFigureOut">
               <a:rPr lang="en-IN" smtClean="0"/>
-              <a:t>21-05-2019</a:t>
+              <a:t>10-04-2021</a:t>
             </a:fld>
             <a:endParaRPr lang="en-IN"/>
           </a:p>
@@ -608,7 +609,7 @@
           <a:p>
             <a:fld id="{70C018FE-C8D6-4A9C-A702-41F1E0C1C452}" type="datetimeFigureOut">
               <a:rPr lang="en-IN" smtClean="0"/>
-              <a:t>21-05-2019</a:t>
+              <a:t>10-04-2021</a:t>
             </a:fld>
             <a:endParaRPr lang="en-IN"/>
           </a:p>
@@ -778,7 +779,7 @@
           <a:p>
             <a:fld id="{70C018FE-C8D6-4A9C-A702-41F1E0C1C452}" type="datetimeFigureOut">
               <a:rPr lang="en-IN" smtClean="0"/>
-              <a:t>21-05-2019</a:t>
+              <a:t>10-04-2021</a:t>
             </a:fld>
             <a:endParaRPr lang="en-IN"/>
           </a:p>
@@ -958,7 +959,7 @@
           <a:p>
             <a:fld id="{70C018FE-C8D6-4A9C-A702-41F1E0C1C452}" type="datetimeFigureOut">
               <a:rPr lang="en-IN" smtClean="0"/>
-              <a:t>21-05-2019</a:t>
+              <a:t>10-04-2021</a:t>
             </a:fld>
             <a:endParaRPr lang="en-IN"/>
           </a:p>
@@ -1390,7 +1391,7 @@
           <a:p>
             <a:fld id="{70C018FE-C8D6-4A9C-A702-41F1E0C1C452}" type="datetimeFigureOut">
               <a:rPr lang="en-IN" smtClean="0"/>
-              <a:t>21-05-2019</a:t>
+              <a:t>10-04-2021</a:t>
             </a:fld>
             <a:endParaRPr lang="en-IN"/>
           </a:p>
@@ -1622,7 +1623,7 @@
           <a:p>
             <a:fld id="{70C018FE-C8D6-4A9C-A702-41F1E0C1C452}" type="datetimeFigureOut">
               <a:rPr lang="en-IN" smtClean="0"/>
-              <a:t>21-05-2019</a:t>
+              <a:t>10-04-2021</a:t>
             </a:fld>
             <a:endParaRPr lang="en-IN"/>
           </a:p>
@@ -1989,7 +1990,7 @@
           <a:p>
             <a:fld id="{70C018FE-C8D6-4A9C-A702-41F1E0C1C452}" type="datetimeFigureOut">
               <a:rPr lang="en-IN" smtClean="0"/>
-              <a:t>21-05-2019</a:t>
+              <a:t>10-04-2021</a:t>
             </a:fld>
             <a:endParaRPr lang="en-IN"/>
           </a:p>
@@ -2107,7 +2108,7 @@
           <a:p>
             <a:fld id="{70C018FE-C8D6-4A9C-A702-41F1E0C1C452}" type="datetimeFigureOut">
               <a:rPr lang="en-IN" smtClean="0"/>
-              <a:t>21-05-2019</a:t>
+              <a:t>10-04-2021</a:t>
             </a:fld>
             <a:endParaRPr lang="en-IN"/>
           </a:p>
@@ -2202,7 +2203,7 @@
           <a:p>
             <a:fld id="{70C018FE-C8D6-4A9C-A702-41F1E0C1C452}" type="datetimeFigureOut">
               <a:rPr lang="en-IN" smtClean="0"/>
-              <a:t>21-05-2019</a:t>
+              <a:t>10-04-2021</a:t>
             </a:fld>
             <a:endParaRPr lang="en-IN"/>
           </a:p>
@@ -2478,7 +2479,7 @@
           <a:p>
             <a:fld id="{70C018FE-C8D6-4A9C-A702-41F1E0C1C452}" type="datetimeFigureOut">
               <a:rPr lang="en-IN" smtClean="0"/>
-              <a:t>21-05-2019</a:t>
+              <a:t>10-04-2021</a:t>
             </a:fld>
             <a:endParaRPr lang="en-IN"/>
           </a:p>
@@ -2735,7 +2736,7 @@
           <a:p>
             <a:fld id="{70C018FE-C8D6-4A9C-A702-41F1E0C1C452}" type="datetimeFigureOut">
               <a:rPr lang="en-IN" smtClean="0"/>
-              <a:t>21-05-2019</a:t>
+              <a:t>10-04-2021</a:t>
             </a:fld>
             <a:endParaRPr lang="en-IN"/>
           </a:p>
@@ -2946,7 +2947,7 @@
           <a:p>
             <a:fld id="{70C018FE-C8D6-4A9C-A702-41F1E0C1C452}" type="datetimeFigureOut">
               <a:rPr lang="en-IN" smtClean="0"/>
-              <a:t>21-05-2019</a:t>
+              <a:t>10-04-2021</a:t>
             </a:fld>
             <a:endParaRPr lang="en-IN" dirty="0"/>
           </a:p>
@@ -3500,7 +3501,7 @@
             <a:pPr algn="l"/>
             <a:r>
               <a:rPr lang="en-IN" sz="1800" dirty="0"/>
-              <a:t>Name:</a:t>
+              <a:t>Name: Gadicherla Sameer </a:t>
             </a:r>
           </a:p>
         </p:txBody>
@@ -3535,33 +3536,44 @@
           <a:chExt cx="0" cy="0"/>
         </a:xfrm>
       </p:grpSpPr>
-      <p:sp>
-        <p:nvSpPr>
-          <p:cNvPr id="3" name="Content Placeholder 2"/>
-          <p:cNvSpPr>
-            <a:spLocks noGrp="1"/>
-          </p:cNvSpPr>
+      <p:pic>
+        <p:nvPicPr>
+          <p:cNvPr id="4" name="Content Placeholder 3">
+            <a:extLst>
+              <a:ext uri="{FF2B5EF4-FFF2-40B4-BE49-F238E27FC236}">
+                <a16:creationId xmlns:a16="http://schemas.microsoft.com/office/drawing/2014/main" id="{156DA577-562B-407F-89DE-0B6A6D12CF0B}"/>
+              </a:ext>
+            </a:extLst>
+          </p:cNvPr>
+          <p:cNvPicPr>
+            <a:picLocks noGrp="1" noChangeAspect="1"/>
+          </p:cNvPicPr>
           <p:nvPr>
             <p:ph idx="1"/>
           </p:nvPr>
-        </p:nvSpPr>
-        <p:spPr/>
-        <p:txBody>
-          <a:bodyPr>
-            <a:normAutofit/>
-          </a:bodyPr>
-          <a:lstStyle/>
-          <a:p>
-            <a:pPr marL="0" indent="0">
-              <a:buNone/>
-            </a:pPr>
-            <a:endParaRPr lang="en-IN" sz="1400" dirty="0"/>
-          </a:p>
-        </p:txBody>
-      </p:sp>
-      <p:sp>
-        <p:nvSpPr>
-          <p:cNvPr id="5" name="Title 1"/>
+        </p:nvPicPr>
+        <p:blipFill>
+          <a:blip r:embed="rId2">
+            <a:extLst>
+              <a:ext uri="{28A0092B-C50C-407E-A947-70E740481C1C}">
+                <a14:useLocalDpi xmlns:a14="http://schemas.microsoft.com/office/drawing/2010/main" val="0"/>
+              </a:ext>
+            </a:extLst>
+          </a:blip>
+          <a:stretch>
+            <a:fillRect/>
+          </a:stretch>
+        </p:blipFill>
+        <p:spPr>
+          <a:xfrm>
+            <a:off x="1542869" y="1304165"/>
+            <a:ext cx="8690117" cy="5337935"/>
+          </a:xfrm>
+        </p:spPr>
+      </p:pic>
+      <p:sp>
+        <p:nvSpPr>
+          <p:cNvPr id="6" name="Title 1"/>
           <p:cNvSpPr>
             <a:spLocks noGrp="1"/>
           </p:cNvSpPr>
@@ -3580,13 +3592,409 @@
           <a:lstStyle/>
           <a:p>
             <a:r>
+              <a:rPr lang="en-US" sz="2800" dirty="0"/>
+              <a:t>Sectors based on Counts in Top3 Countries</a:t>
+            </a:r>
+            <a:endParaRPr lang="en-IN" sz="2800" dirty="0"/>
+          </a:p>
+        </p:txBody>
+      </p:sp>
+    </p:spTree>
+    <p:extLst>
+      <p:ext uri="{BB962C8B-B14F-4D97-AF65-F5344CB8AC3E}">
+        <p14:creationId xmlns:p14="http://schemas.microsoft.com/office/powerpoint/2010/main" val="1057818561"/>
+      </p:ext>
+    </p:extLst>
+  </p:cSld>
+  <p:clrMapOvr>
+    <a:masterClrMapping/>
+  </p:clrMapOvr>
+</p:sld>
+</file>
+
+<file path=ppt/slides/slide11.xml><?xml version="1.0" encoding="utf-8"?>
+<p:sld xmlns:a="http://schemas.openxmlformats.org/drawingml/2006/main" xmlns:r="http://schemas.openxmlformats.org/officeDocument/2006/relationships" xmlns:p="http://schemas.openxmlformats.org/presentationml/2006/main">
+  <p:cSld>
+    <p:spTree>
+      <p:nvGrpSpPr>
+        <p:cNvPr id="1" name=""/>
+        <p:cNvGrpSpPr/>
+        <p:nvPr/>
+      </p:nvGrpSpPr>
+      <p:grpSpPr>
+        <a:xfrm>
+          <a:off x="0" y="0"/>
+          <a:ext cx="0" cy="0"/>
+          <a:chOff x="0" y="0"/>
+          <a:chExt cx="0" cy="0"/>
+        </a:xfrm>
+      </p:grpSpPr>
+      <p:sp>
+        <p:nvSpPr>
+          <p:cNvPr id="3" name="Content Placeholder 2"/>
+          <p:cNvSpPr>
+            <a:spLocks noGrp="1"/>
+          </p:cNvSpPr>
+          <p:nvPr>
+            <p:ph idx="1"/>
+          </p:nvPr>
+        </p:nvSpPr>
+        <p:spPr>
+          <a:xfrm>
+            <a:off x="316049" y="1873659"/>
+            <a:ext cx="11168742" cy="4781141"/>
+          </a:xfrm>
+        </p:spPr>
+        <p:txBody>
+          <a:bodyPr>
+            <a:normAutofit fontScale="70000" lnSpcReduction="20000"/>
+          </a:bodyPr>
+          <a:lstStyle/>
+          <a:p>
+            <a:pPr marL="514350" indent="-514350" algn="l">
+              <a:buFont typeface="+mj-lt"/>
+              <a:buAutoNum type="arabicPeriod"/>
+            </a:pPr>
+            <a:r>
+              <a:rPr lang="en-US" b="0" i="0" dirty="0">
+                <a:solidFill>
+                  <a:srgbClr val="000000"/>
+                </a:solidFill>
+                <a:effectLst/>
+              </a:rPr>
+              <a:t>There are more than one companies </a:t>
+            </a:r>
+            <a:r>
+              <a:rPr lang="en-US" b="0" i="0" dirty="0" err="1">
+                <a:solidFill>
+                  <a:srgbClr val="000000"/>
+                </a:solidFill>
+                <a:effectLst/>
+              </a:rPr>
+              <a:t>recieving</a:t>
+            </a:r>
+            <a:r>
+              <a:rPr lang="en-US" b="0" i="0" dirty="0">
+                <a:solidFill>
+                  <a:srgbClr val="000000"/>
+                </a:solidFill>
+                <a:effectLst/>
+              </a:rPr>
+              <a:t> the top fund in USA , GBR and IND under the top sector and the second top sector</a:t>
+            </a:r>
+          </a:p>
+          <a:p>
+            <a:pPr marL="514350" indent="-514350" algn="l">
+              <a:buFont typeface="+mj-lt"/>
+              <a:buAutoNum type="arabicPeriod"/>
+            </a:pPr>
+            <a:r>
+              <a:rPr lang="en-US" b="0" i="0" dirty="0">
+                <a:solidFill>
+                  <a:srgbClr val="000000"/>
+                </a:solidFill>
+                <a:effectLst/>
+              </a:rPr>
+              <a:t>Since SparkFunds wants to invest in a funding type where most companies do, we have selected venture as the best one.</a:t>
+            </a:r>
+          </a:p>
+          <a:p>
+            <a:pPr marL="514350" indent="-514350" algn="l">
+              <a:buFont typeface="+mj-lt"/>
+              <a:buAutoNum type="arabicPeriod"/>
+            </a:pPr>
+            <a:r>
+              <a:rPr lang="en-US" b="0" i="0" dirty="0">
+                <a:solidFill>
+                  <a:srgbClr val="000000"/>
+                </a:solidFill>
+                <a:effectLst/>
+              </a:rPr>
+              <a:t>Since SparkFunds wants to invest in a top English speaking country , we can invest in </a:t>
+            </a:r>
+            <a:r>
+              <a:rPr lang="en-US" b="1" i="0" dirty="0">
+                <a:solidFill>
+                  <a:srgbClr val="000000"/>
+                </a:solidFill>
+                <a:effectLst/>
+              </a:rPr>
+              <a:t>USA</a:t>
+            </a:r>
+            <a:r>
+              <a:rPr lang="en-US" b="0" i="0" dirty="0">
+                <a:solidFill>
+                  <a:srgbClr val="000000"/>
+                </a:solidFill>
+                <a:effectLst/>
+              </a:rPr>
+              <a:t> as it has the highest number of investments done among the top three countries including </a:t>
+            </a:r>
+            <a:r>
+              <a:rPr lang="en-US" b="1" i="0" dirty="0">
+                <a:solidFill>
+                  <a:srgbClr val="000000"/>
+                </a:solidFill>
+                <a:effectLst/>
+              </a:rPr>
+              <a:t>GBR</a:t>
+            </a:r>
+            <a:r>
+              <a:rPr lang="en-US" b="0" i="0" dirty="0">
+                <a:solidFill>
+                  <a:srgbClr val="000000"/>
+                </a:solidFill>
+                <a:effectLst/>
+              </a:rPr>
+              <a:t> and </a:t>
+            </a:r>
+            <a:r>
+              <a:rPr lang="en-US" b="1" i="0" dirty="0">
+                <a:solidFill>
+                  <a:srgbClr val="000000"/>
+                </a:solidFill>
+                <a:effectLst/>
+              </a:rPr>
+              <a:t>IND</a:t>
+            </a:r>
+            <a:r>
+              <a:rPr lang="en-US" b="0" i="0" dirty="0">
+                <a:solidFill>
+                  <a:srgbClr val="000000"/>
+                </a:solidFill>
+                <a:effectLst/>
+              </a:rPr>
+              <a:t>.</a:t>
+            </a:r>
+          </a:p>
+          <a:p>
+            <a:pPr marL="514350" indent="-514350" algn="l">
+              <a:buFont typeface="+mj-lt"/>
+              <a:buAutoNum type="arabicPeriod"/>
+            </a:pPr>
+            <a:r>
+              <a:rPr lang="en-US" b="0" i="0" dirty="0">
+                <a:solidFill>
+                  <a:srgbClr val="000000"/>
+                </a:solidFill>
+                <a:effectLst/>
+              </a:rPr>
+              <a:t>Since SparkFunds wants to invest in a sector which has the highest number of investments, </a:t>
+            </a:r>
+            <a:r>
+              <a:rPr lang="en-US" b="1" i="0" dirty="0">
+                <a:solidFill>
+                  <a:srgbClr val="000000"/>
+                </a:solidFill>
+                <a:effectLst/>
+              </a:rPr>
+              <a:t>Others</a:t>
+            </a:r>
+            <a:r>
+              <a:rPr lang="en-US" b="0" i="0" dirty="0">
+                <a:solidFill>
+                  <a:srgbClr val="000000"/>
+                </a:solidFill>
+                <a:effectLst/>
+              </a:rPr>
+              <a:t> is the one which is highly contributed sector.</a:t>
+            </a:r>
+          </a:p>
+          <a:p>
+            <a:pPr marL="514350" indent="-514350" algn="l">
+              <a:buFont typeface="+mj-lt"/>
+              <a:buAutoNum type="arabicPeriod"/>
+            </a:pPr>
+            <a:r>
+              <a:rPr lang="en-US" b="0" i="0" dirty="0">
+                <a:solidFill>
+                  <a:srgbClr val="000000"/>
+                </a:solidFill>
+                <a:effectLst/>
+              </a:rPr>
+              <a:t>But this sector has a little uncertainty because this sector is not focused on Prime Area of Knowledge. Instead if we can invest in the second highest sector in </a:t>
+            </a:r>
+            <a:r>
+              <a:rPr lang="en-US" b="1" i="0" dirty="0">
+                <a:solidFill>
+                  <a:srgbClr val="000000"/>
+                </a:solidFill>
+                <a:effectLst/>
+              </a:rPr>
+              <a:t>USA</a:t>
+            </a:r>
+            <a:r>
+              <a:rPr lang="en-US" b="0" i="0" dirty="0">
+                <a:solidFill>
+                  <a:srgbClr val="000000"/>
+                </a:solidFill>
+                <a:effectLst/>
+              </a:rPr>
+              <a:t> i.e., </a:t>
+            </a:r>
+            <a:r>
+              <a:rPr lang="en-US" b="1" i="0" dirty="0">
+                <a:solidFill>
+                  <a:srgbClr val="000000"/>
+                </a:solidFill>
+                <a:effectLst/>
+              </a:rPr>
+              <a:t>Social-Finance-Analytics-Advertising</a:t>
+            </a:r>
+            <a:r>
+              <a:rPr lang="en-US" b="0" i="0" dirty="0">
+                <a:solidFill>
+                  <a:srgbClr val="000000"/>
+                </a:solidFill>
+                <a:effectLst/>
+              </a:rPr>
+              <a:t> , it is kind of a better investment as the domain here is fixed and </a:t>
+            </a:r>
+            <a:r>
+              <a:rPr lang="en-US" b="1" i="0" dirty="0">
+                <a:solidFill>
+                  <a:srgbClr val="000000"/>
+                </a:solidFill>
+                <a:effectLst/>
+              </a:rPr>
+              <a:t>2658</a:t>
+            </a:r>
+            <a:r>
+              <a:rPr lang="en-US" b="0" i="0" dirty="0">
+                <a:solidFill>
+                  <a:srgbClr val="000000"/>
+                </a:solidFill>
+                <a:effectLst/>
+              </a:rPr>
+              <a:t> </a:t>
+            </a:r>
+            <a:r>
+              <a:rPr lang="en-US" b="0" i="0" dirty="0" err="1">
+                <a:solidFill>
+                  <a:srgbClr val="000000"/>
+                </a:solidFill>
+                <a:effectLst/>
+              </a:rPr>
+              <a:t>investements</a:t>
+            </a:r>
+            <a:r>
+              <a:rPr lang="en-US" b="0" i="0" dirty="0">
+                <a:solidFill>
+                  <a:srgbClr val="000000"/>
+                </a:solidFill>
+                <a:effectLst/>
+              </a:rPr>
+              <a:t> are done here which are close to </a:t>
+            </a:r>
+            <a:r>
+              <a:rPr lang="en-US" b="1" i="0" dirty="0">
+                <a:solidFill>
+                  <a:srgbClr val="000000"/>
+                </a:solidFill>
+                <a:effectLst/>
+              </a:rPr>
+              <a:t>2923</a:t>
+            </a:r>
+            <a:r>
+              <a:rPr lang="en-US" b="0" i="0" dirty="0">
+                <a:solidFill>
+                  <a:srgbClr val="000000"/>
+                </a:solidFill>
+                <a:effectLst/>
+              </a:rPr>
+              <a:t> investments done in </a:t>
+            </a:r>
+            <a:r>
+              <a:rPr lang="en-US" b="1" i="0" dirty="0">
+                <a:solidFill>
+                  <a:srgbClr val="000000"/>
+                </a:solidFill>
+                <a:effectLst/>
+              </a:rPr>
+              <a:t>Others</a:t>
+            </a:r>
+            <a:r>
+              <a:rPr lang="en-US" b="0" i="0" dirty="0">
+                <a:solidFill>
+                  <a:srgbClr val="000000"/>
+                </a:solidFill>
+                <a:effectLst/>
+              </a:rPr>
+              <a:t>.</a:t>
+            </a:r>
+          </a:p>
+          <a:p>
+            <a:pPr lvl="2"/>
+            <a:r>
+              <a:rPr lang="en-US" sz="2900" b="0" i="0" dirty="0">
+                <a:solidFill>
+                  <a:srgbClr val="000000"/>
+                </a:solidFill>
+                <a:effectLst/>
+              </a:rPr>
+              <a:t>There are 188 companies in which SparkFunds can invest in this particular Sector.</a:t>
+            </a:r>
+          </a:p>
+          <a:p>
+            <a:pPr lvl="2"/>
+            <a:r>
+              <a:rPr lang="en-US" sz="2900" b="0" i="0" dirty="0">
+                <a:solidFill>
+                  <a:srgbClr val="000000"/>
+                </a:solidFill>
+                <a:effectLst/>
+              </a:rPr>
+              <a:t>Since we have used the ranges 5M to 15M as inclusive , we are seeing more than 1 company receiving the highest fund</a:t>
+            </a:r>
+          </a:p>
+          <a:p>
+            <a:pPr lvl="2"/>
+            <a:r>
+              <a:rPr lang="en-US" sz="2900" b="0" i="0" dirty="0">
+                <a:solidFill>
+                  <a:srgbClr val="000000"/>
+                </a:solidFill>
+                <a:effectLst/>
+              </a:rPr>
+              <a:t>Outlier removal wasn't necessary due to given reasons before where the budget cap itself helped us eliminate most of them</a:t>
+            </a:r>
+            <a:r>
+              <a:rPr lang="en-US" sz="2300" b="0" i="0" dirty="0">
+                <a:solidFill>
+                  <a:srgbClr val="000000"/>
+                </a:solidFill>
+                <a:effectLst/>
+              </a:rPr>
+              <a:t>.</a:t>
+            </a:r>
+          </a:p>
+        </p:txBody>
+      </p:sp>
+      <p:sp>
+        <p:nvSpPr>
+          <p:cNvPr id="5" name="Title 1"/>
+          <p:cNvSpPr>
+            <a:spLocks noGrp="1"/>
+          </p:cNvSpPr>
+          <p:nvPr>
+            <p:ph type="title"/>
+          </p:nvPr>
+        </p:nvSpPr>
+        <p:spPr>
+          <a:xfrm>
+            <a:off x="1136469" y="640080"/>
+            <a:ext cx="9313817" cy="856138"/>
+          </a:xfrm>
+        </p:spPr>
+        <p:txBody>
+          <a:bodyPr/>
+          <a:lstStyle/>
+          <a:p>
+            <a:r>
               <a:rPr lang="en-IN" b="1" dirty="0"/>
-              <a:t> </a:t>
-            </a:r>
-            <a:r>
-              <a:rPr lang="en-IN" sz="2800" dirty="0"/>
-              <a:t>&lt;Conclusions&gt;</a:t>
-            </a:r>
+              <a:t>Conclusions	</a:t>
+            </a:r>
+            <a:endParaRPr lang="en-IN" sz="2800" dirty="0"/>
           </a:p>
         </p:txBody>
       </p:sp>
@@ -3637,8 +4045,141 @@
           </a:bodyPr>
           <a:lstStyle/>
           <a:p>
-            <a:pPr marL="0" indent="0">
-              <a:buNone/>
+            <a:pPr marL="342900" indent="-342900">
+              <a:buFont typeface="+mj-lt"/>
+              <a:buAutoNum type="arabicPeriod"/>
+            </a:pPr>
+            <a:r>
+              <a:rPr lang="en-IN" sz="2000" dirty="0" err="1"/>
+              <a:t>SparkFunds</a:t>
+            </a:r>
+            <a:r>
+              <a:rPr lang="en-IN" sz="2000" dirty="0"/>
+              <a:t> is a company which is looking to invest into few companies</a:t>
+            </a:r>
+          </a:p>
+          <a:p>
+            <a:pPr marL="342900" indent="-342900">
+              <a:buFont typeface="+mj-lt"/>
+              <a:buAutoNum type="arabicPeriod"/>
+            </a:pPr>
+            <a:r>
+              <a:rPr lang="en-IN" sz="2000" dirty="0"/>
+              <a:t>It wants to invest in companies where most of the other funding agencies/companies are investing.</a:t>
+            </a:r>
+          </a:p>
+          <a:p>
+            <a:pPr marL="342900" indent="-342900">
+              <a:buFont typeface="+mj-lt"/>
+              <a:buAutoNum type="arabicPeriod"/>
+            </a:pPr>
+            <a:r>
+              <a:rPr lang="en-IN" sz="2000" dirty="0"/>
+              <a:t>It wants to invest in countries where English is accepted as an official language</a:t>
+            </a:r>
+          </a:p>
+          <a:p>
+            <a:pPr marL="342900" indent="-342900">
+              <a:buFont typeface="+mj-lt"/>
+              <a:buAutoNum type="arabicPeriod"/>
+            </a:pPr>
+            <a:r>
+              <a:rPr lang="en-IN" sz="2000" dirty="0" err="1"/>
+              <a:t>SparkFunds</a:t>
+            </a:r>
+            <a:r>
+              <a:rPr lang="en-IN" sz="2000" dirty="0"/>
+              <a:t> wants to even invest in one of the most happening type of investments amongst </a:t>
+            </a:r>
+            <a:r>
+              <a:rPr lang="en-IN" sz="2000" b="1" dirty="0"/>
+              <a:t>seed</a:t>
+            </a:r>
+            <a:r>
+              <a:rPr lang="en-IN" sz="2000" dirty="0"/>
+              <a:t>, </a:t>
+            </a:r>
+            <a:r>
+              <a:rPr lang="en-IN" sz="2000" b="1" dirty="0"/>
+              <a:t>angel</a:t>
+            </a:r>
+            <a:r>
+              <a:rPr lang="en-IN" sz="2000" dirty="0"/>
+              <a:t>, </a:t>
+            </a:r>
+            <a:r>
+              <a:rPr lang="en-IN" sz="2000" b="1" dirty="0"/>
+              <a:t>venture</a:t>
+            </a:r>
+            <a:r>
+              <a:rPr lang="en-IN" sz="2000" dirty="0"/>
+              <a:t> and </a:t>
+            </a:r>
+            <a:r>
+              <a:rPr lang="en-IN" sz="2000" b="1" dirty="0" err="1"/>
+              <a:t>private_equity</a:t>
+            </a:r>
+            <a:r>
+              <a:rPr lang="en-IN" sz="2000" dirty="0"/>
+              <a:t> types.</a:t>
+            </a:r>
+          </a:p>
+          <a:p>
+            <a:pPr marL="342900" indent="-342900">
+              <a:buFont typeface="+mj-lt"/>
+              <a:buAutoNum type="arabicPeriod"/>
+            </a:pPr>
+            <a:r>
+              <a:rPr lang="en-IN" sz="2000" dirty="0"/>
+              <a:t>It has a budget limit which it can invest. </a:t>
+            </a:r>
+            <a:r>
+              <a:rPr lang="en-IN" sz="2000" b="1" dirty="0"/>
+              <a:t>5 million USD </a:t>
+            </a:r>
+            <a:r>
+              <a:rPr lang="en-IN" sz="2000" dirty="0"/>
+              <a:t>to </a:t>
+            </a:r>
+            <a:r>
+              <a:rPr lang="en-IN" sz="2000" b="1" dirty="0"/>
+              <a:t>15 million USD</a:t>
+            </a:r>
+          </a:p>
+          <a:p>
+            <a:pPr marL="342900" indent="-342900">
+              <a:buFont typeface="+mj-lt"/>
+              <a:buAutoNum type="arabicPeriod"/>
+            </a:pPr>
+            <a:r>
+              <a:rPr lang="en-IN" sz="2000" dirty="0"/>
+              <a:t>We have data of all the investments done companies which fall into different primary sectors.</a:t>
+            </a:r>
+          </a:p>
+          <a:p>
+            <a:pPr marL="342900" indent="-342900">
+              <a:buFont typeface="+mj-lt"/>
+              <a:buAutoNum type="arabicPeriod"/>
+            </a:pPr>
+            <a:r>
+              <a:rPr lang="en-IN" sz="2000" dirty="0"/>
+              <a:t>These primary sectors are mapped to a single major sector. Data for this is also given.</a:t>
+            </a:r>
+          </a:p>
+          <a:p>
+            <a:pPr marL="342900" indent="-342900">
+              <a:buFont typeface="+mj-lt"/>
+              <a:buAutoNum type="arabicPeriod"/>
+            </a:pPr>
+            <a:r>
+              <a:rPr lang="en-IN" sz="2000" dirty="0"/>
+              <a:t>Our task is to suggest the country, funding type, major sector and potential investment amount.</a:t>
+            </a:r>
+          </a:p>
+          <a:p>
+            <a:pPr marL="342900" indent="-342900">
+              <a:buFont typeface="+mj-lt"/>
+              <a:buAutoNum type="arabicPeriod"/>
             </a:pPr>
             <a:endParaRPr lang="en-IN" sz="1400" dirty="0"/>
           </a:p>
@@ -3665,13 +4206,14 @@
           <a:lstStyle/>
           <a:p>
             <a:r>
+              <a:rPr lang="en-IN" b="1" dirty="0" err="1"/>
+              <a:t>SparkFunds</a:t>
+            </a:r>
+            <a:r>
               <a:rPr lang="en-IN" b="1" dirty="0"/>
-              <a:t> </a:t>
-            </a:r>
-            <a:r>
-              <a:rPr lang="en-IN" sz="2800" dirty="0"/>
-              <a:t>&lt;Abstract&gt;</a:t>
-            </a:r>
+              <a:t> Investment Assist - Abstract</a:t>
+            </a:r>
+            <a:endParaRPr lang="en-IN" sz="2800" dirty="0"/>
           </a:p>
         </p:txBody>
       </p:sp>
@@ -3707,33 +4249,6 @@
       </p:grpSpPr>
       <p:sp>
         <p:nvSpPr>
-          <p:cNvPr id="3" name="Content Placeholder 2"/>
-          <p:cNvSpPr>
-            <a:spLocks noGrp="1"/>
-          </p:cNvSpPr>
-          <p:nvPr>
-            <p:ph idx="1"/>
-          </p:nvPr>
-        </p:nvSpPr>
-        <p:spPr/>
-        <p:txBody>
-          <a:bodyPr>
-            <a:normAutofit/>
-          </a:bodyPr>
-          <a:lstStyle/>
-          <a:p>
-            <a:pPr marL="0" indent="0">
-              <a:buNone/>
-            </a:pPr>
-            <a:r>
-              <a:rPr lang="en-IN" sz="1800" dirty="0"/>
-              <a:t>Use flow chart</a:t>
-            </a:r>
-          </a:p>
-        </p:txBody>
-      </p:sp>
-      <p:sp>
-        <p:nvSpPr>
           <p:cNvPr id="5" name="Title 1"/>
           <p:cNvSpPr>
             <a:spLocks noGrp="1"/>
@@ -3758,8 +4273,966 @@
             </a:r>
             <a:r>
               <a:rPr lang="en-IN" sz="2800" dirty="0"/>
-              <a:t>&lt;Problem solving methodology&gt;</a:t>
-            </a:r>
+              <a:t>Methodology</a:t>
+            </a:r>
+          </a:p>
+        </p:txBody>
+      </p:sp>
+      <p:sp>
+        <p:nvSpPr>
+          <p:cNvPr id="2" name="Rectangle 1">
+            <a:extLst>
+              <a:ext uri="{FF2B5EF4-FFF2-40B4-BE49-F238E27FC236}">
+                <a16:creationId xmlns:a16="http://schemas.microsoft.com/office/drawing/2014/main" id="{1A86657B-F6AF-4041-B9A7-B09AA0FB2902}"/>
+              </a:ext>
+            </a:extLst>
+          </p:cNvPr>
+          <p:cNvSpPr/>
+          <p:nvPr/>
+        </p:nvSpPr>
+        <p:spPr>
+          <a:xfrm>
+            <a:off x="800100" y="1676400"/>
+            <a:ext cx="1879600" cy="856138"/>
+          </a:xfrm>
+          <a:prstGeom prst="rect">
+            <a:avLst/>
+          </a:prstGeom>
+        </p:spPr>
+        <p:style>
+          <a:lnRef idx="2">
+            <a:schemeClr val="accent6"/>
+          </a:lnRef>
+          <a:fillRef idx="1">
+            <a:schemeClr val="lt1"/>
+          </a:fillRef>
+          <a:effectRef idx="0">
+            <a:schemeClr val="accent6"/>
+          </a:effectRef>
+          <a:fontRef idx="minor">
+            <a:schemeClr val="dk1"/>
+          </a:fontRef>
+        </p:style>
+        <p:txBody>
+          <a:bodyPr rtlCol="0" anchor="ctr"/>
+          <a:lstStyle/>
+          <a:p>
+            <a:pPr algn="ctr"/>
+            <a:r>
+              <a:rPr lang="en-IN" dirty="0"/>
+              <a:t>Data Arrangement &amp; Cleaning</a:t>
+            </a:r>
+          </a:p>
+        </p:txBody>
+      </p:sp>
+      <p:sp>
+        <p:nvSpPr>
+          <p:cNvPr id="4" name="Rectangle 3">
+            <a:extLst>
+              <a:ext uri="{FF2B5EF4-FFF2-40B4-BE49-F238E27FC236}">
+                <a16:creationId xmlns:a16="http://schemas.microsoft.com/office/drawing/2014/main" id="{F1C41072-DEF9-4608-A475-BAD2516C88CE}"/>
+              </a:ext>
+            </a:extLst>
+          </p:cNvPr>
+          <p:cNvSpPr/>
+          <p:nvPr/>
+        </p:nvSpPr>
+        <p:spPr>
+          <a:xfrm>
+            <a:off x="3810000" y="1676400"/>
+            <a:ext cx="1727200" cy="856138"/>
+          </a:xfrm>
+          <a:prstGeom prst="rect">
+            <a:avLst/>
+          </a:prstGeom>
+        </p:spPr>
+        <p:style>
+          <a:lnRef idx="2">
+            <a:schemeClr val="accent6"/>
+          </a:lnRef>
+          <a:fillRef idx="1">
+            <a:schemeClr val="lt1"/>
+          </a:fillRef>
+          <a:effectRef idx="0">
+            <a:schemeClr val="accent6"/>
+          </a:effectRef>
+          <a:fontRef idx="minor">
+            <a:schemeClr val="dk1"/>
+          </a:fontRef>
+        </p:style>
+        <p:txBody>
+          <a:bodyPr rtlCol="0" anchor="ctr"/>
+          <a:lstStyle/>
+          <a:p>
+            <a:pPr algn="ctr"/>
+            <a:r>
+              <a:rPr lang="en-IN" dirty="0"/>
+              <a:t>Fund Type </a:t>
+            </a:r>
+          </a:p>
+          <a:p>
+            <a:pPr algn="ctr"/>
+            <a:r>
+              <a:rPr lang="en-IN" dirty="0"/>
+              <a:t>Analysis</a:t>
+            </a:r>
+          </a:p>
+        </p:txBody>
+      </p:sp>
+      <p:sp>
+        <p:nvSpPr>
+          <p:cNvPr id="7" name="Content Placeholder 6">
+            <a:extLst>
+              <a:ext uri="{FF2B5EF4-FFF2-40B4-BE49-F238E27FC236}">
+                <a16:creationId xmlns:a16="http://schemas.microsoft.com/office/drawing/2014/main" id="{90675756-86A2-440A-B3D4-B7DA7FC51992}"/>
+              </a:ext>
+            </a:extLst>
+          </p:cNvPr>
+          <p:cNvSpPr>
+            <a:spLocks noGrp="1"/>
+          </p:cNvSpPr>
+          <p:nvPr>
+            <p:ph idx="1"/>
+          </p:nvPr>
+        </p:nvSpPr>
+        <p:spPr>
+          <a:xfrm>
+            <a:off x="6538913" y="1676399"/>
+            <a:ext cx="1727200" cy="856139"/>
+          </a:xfrm>
+          <a:prstGeom prst="rect">
+            <a:avLst/>
+          </a:prstGeom>
+        </p:spPr>
+        <p:style>
+          <a:lnRef idx="2">
+            <a:schemeClr val="accent6"/>
+          </a:lnRef>
+          <a:fillRef idx="1">
+            <a:schemeClr val="lt1"/>
+          </a:fillRef>
+          <a:effectRef idx="0">
+            <a:schemeClr val="accent6"/>
+          </a:effectRef>
+          <a:fontRef idx="minor">
+            <a:schemeClr val="dk1"/>
+          </a:fontRef>
+        </p:style>
+        <p:txBody>
+          <a:bodyPr rtlCol="0" anchor="ctr">
+            <a:normAutofit/>
+          </a:bodyPr>
+          <a:lstStyle/>
+          <a:p>
+            <a:pPr marL="0" indent="0" algn="ctr">
+              <a:buNone/>
+            </a:pPr>
+            <a:r>
+              <a:rPr lang="en-IN" sz="1800" dirty="0"/>
+              <a:t>Country Analysis</a:t>
+            </a:r>
+          </a:p>
+        </p:txBody>
+      </p:sp>
+      <p:sp>
+        <p:nvSpPr>
+          <p:cNvPr id="8" name="Content Placeholder 6">
+            <a:extLst>
+              <a:ext uri="{FF2B5EF4-FFF2-40B4-BE49-F238E27FC236}">
+                <a16:creationId xmlns:a16="http://schemas.microsoft.com/office/drawing/2014/main" id="{949248B6-4206-48A1-A73E-287BBE9E45EE}"/>
+              </a:ext>
+            </a:extLst>
+          </p:cNvPr>
+          <p:cNvSpPr txBox="1">
+            <a:spLocks/>
+          </p:cNvSpPr>
+          <p:nvPr/>
+        </p:nvSpPr>
+        <p:spPr>
+          <a:xfrm>
+            <a:off x="9396413" y="1676398"/>
+            <a:ext cx="1727200" cy="856139"/>
+          </a:xfrm>
+          <a:prstGeom prst="rect">
+            <a:avLst/>
+          </a:prstGeom>
+        </p:spPr>
+        <p:style>
+          <a:lnRef idx="2">
+            <a:schemeClr val="accent6"/>
+          </a:lnRef>
+          <a:fillRef idx="1">
+            <a:schemeClr val="lt1"/>
+          </a:fillRef>
+          <a:effectRef idx="0">
+            <a:schemeClr val="accent6"/>
+          </a:effectRef>
+          <a:fontRef idx="minor">
+            <a:schemeClr val="dk1"/>
+          </a:fontRef>
+        </p:style>
+        <p:txBody>
+          <a:bodyPr vert="horz" lIns="91440" tIns="45720" rIns="91440" bIns="45720" rtlCol="0" anchor="ctr">
+            <a:normAutofit/>
+          </a:bodyPr>
+          <a:lstStyle>
+            <a:lvl1pPr marL="228600" indent="-228600" algn="l" defTabSz="914400" rtl="0" eaLnBrk="1" latinLnBrk="0" hangingPunct="1">
+              <a:lnSpc>
+                <a:spcPct val="90000"/>
+              </a:lnSpc>
+              <a:spcBef>
+                <a:spcPts val="1000"/>
+              </a:spcBef>
+              <a:buFont typeface="Arial" panose="020B0604020202020204" pitchFamily="34" charset="0"/>
+              <a:buChar char="•"/>
+              <a:defRPr sz="2800" kern="1200">
+                <a:solidFill>
+                  <a:schemeClr val="dk1"/>
+                </a:solidFill>
+                <a:latin typeface="+mn-lt"/>
+                <a:ea typeface="+mn-ea"/>
+                <a:cs typeface="+mn-cs"/>
+              </a:defRPr>
+            </a:lvl1pPr>
+            <a:lvl2pPr marL="685800" indent="-228600" algn="l" defTabSz="914400" rtl="0" eaLnBrk="1" latinLnBrk="0" hangingPunct="1">
+              <a:lnSpc>
+                <a:spcPct val="90000"/>
+              </a:lnSpc>
+              <a:spcBef>
+                <a:spcPts val="500"/>
+              </a:spcBef>
+              <a:buFont typeface="Arial" panose="020B0604020202020204" pitchFamily="34" charset="0"/>
+              <a:buChar char="•"/>
+              <a:defRPr sz="2400" kern="1200">
+                <a:solidFill>
+                  <a:schemeClr val="dk1"/>
+                </a:solidFill>
+                <a:latin typeface="+mn-lt"/>
+                <a:ea typeface="+mn-ea"/>
+                <a:cs typeface="+mn-cs"/>
+              </a:defRPr>
+            </a:lvl2pPr>
+            <a:lvl3pPr marL="1143000" indent="-228600" algn="l" defTabSz="914400" rtl="0" eaLnBrk="1" latinLnBrk="0" hangingPunct="1">
+              <a:lnSpc>
+                <a:spcPct val="90000"/>
+              </a:lnSpc>
+              <a:spcBef>
+                <a:spcPts val="500"/>
+              </a:spcBef>
+              <a:buFont typeface="Arial" panose="020B0604020202020204" pitchFamily="34" charset="0"/>
+              <a:buChar char="•"/>
+              <a:defRPr sz="2000" kern="1200">
+                <a:solidFill>
+                  <a:schemeClr val="dk1"/>
+                </a:solidFill>
+                <a:latin typeface="+mn-lt"/>
+                <a:ea typeface="+mn-ea"/>
+                <a:cs typeface="+mn-cs"/>
+              </a:defRPr>
+            </a:lvl3pPr>
+            <a:lvl4pPr marL="1600200" indent="-228600" algn="l" defTabSz="914400" rtl="0" eaLnBrk="1" latinLnBrk="0" hangingPunct="1">
+              <a:lnSpc>
+                <a:spcPct val="90000"/>
+              </a:lnSpc>
+              <a:spcBef>
+                <a:spcPts val="500"/>
+              </a:spcBef>
+              <a:buFont typeface="Arial" panose="020B0604020202020204" pitchFamily="34" charset="0"/>
+              <a:buChar char="•"/>
+              <a:defRPr sz="1800" kern="1200">
+                <a:solidFill>
+                  <a:schemeClr val="dk1"/>
+                </a:solidFill>
+                <a:latin typeface="+mn-lt"/>
+                <a:ea typeface="+mn-ea"/>
+                <a:cs typeface="+mn-cs"/>
+              </a:defRPr>
+            </a:lvl4pPr>
+            <a:lvl5pPr marL="2057400" indent="-228600" algn="l" defTabSz="914400" rtl="0" eaLnBrk="1" latinLnBrk="0" hangingPunct="1">
+              <a:lnSpc>
+                <a:spcPct val="90000"/>
+              </a:lnSpc>
+              <a:spcBef>
+                <a:spcPts val="500"/>
+              </a:spcBef>
+              <a:buFont typeface="Arial" panose="020B0604020202020204" pitchFamily="34" charset="0"/>
+              <a:buChar char="•"/>
+              <a:defRPr sz="1800" kern="1200">
+                <a:solidFill>
+                  <a:schemeClr val="dk1"/>
+                </a:solidFill>
+                <a:latin typeface="+mn-lt"/>
+                <a:ea typeface="+mn-ea"/>
+                <a:cs typeface="+mn-cs"/>
+              </a:defRPr>
+            </a:lvl5pPr>
+            <a:lvl6pPr marL="2514600" indent="-228600" algn="l" defTabSz="914400" rtl="0" eaLnBrk="1" latinLnBrk="0" hangingPunct="1">
+              <a:lnSpc>
+                <a:spcPct val="90000"/>
+              </a:lnSpc>
+              <a:spcBef>
+                <a:spcPts val="500"/>
+              </a:spcBef>
+              <a:buFont typeface="Arial" panose="020B0604020202020204" pitchFamily="34" charset="0"/>
+              <a:buChar char="•"/>
+              <a:defRPr sz="1800" kern="1200">
+                <a:solidFill>
+                  <a:schemeClr val="dk1"/>
+                </a:solidFill>
+                <a:latin typeface="+mn-lt"/>
+                <a:ea typeface="+mn-ea"/>
+                <a:cs typeface="+mn-cs"/>
+              </a:defRPr>
+            </a:lvl6pPr>
+            <a:lvl7pPr marL="2971800" indent="-228600" algn="l" defTabSz="914400" rtl="0" eaLnBrk="1" latinLnBrk="0" hangingPunct="1">
+              <a:lnSpc>
+                <a:spcPct val="90000"/>
+              </a:lnSpc>
+              <a:spcBef>
+                <a:spcPts val="500"/>
+              </a:spcBef>
+              <a:buFont typeface="Arial" panose="020B0604020202020204" pitchFamily="34" charset="0"/>
+              <a:buChar char="•"/>
+              <a:defRPr sz="1800" kern="1200">
+                <a:solidFill>
+                  <a:schemeClr val="dk1"/>
+                </a:solidFill>
+                <a:latin typeface="+mn-lt"/>
+                <a:ea typeface="+mn-ea"/>
+                <a:cs typeface="+mn-cs"/>
+              </a:defRPr>
+            </a:lvl7pPr>
+            <a:lvl8pPr marL="3429000" indent="-228600" algn="l" defTabSz="914400" rtl="0" eaLnBrk="1" latinLnBrk="0" hangingPunct="1">
+              <a:lnSpc>
+                <a:spcPct val="90000"/>
+              </a:lnSpc>
+              <a:spcBef>
+                <a:spcPts val="500"/>
+              </a:spcBef>
+              <a:buFont typeface="Arial" panose="020B0604020202020204" pitchFamily="34" charset="0"/>
+              <a:buChar char="•"/>
+              <a:defRPr sz="1800" kern="1200">
+                <a:solidFill>
+                  <a:schemeClr val="dk1"/>
+                </a:solidFill>
+                <a:latin typeface="+mn-lt"/>
+                <a:ea typeface="+mn-ea"/>
+                <a:cs typeface="+mn-cs"/>
+              </a:defRPr>
+            </a:lvl8pPr>
+            <a:lvl9pPr marL="3886200" indent="-228600" algn="l" defTabSz="914400" rtl="0" eaLnBrk="1" latinLnBrk="0" hangingPunct="1">
+              <a:lnSpc>
+                <a:spcPct val="90000"/>
+              </a:lnSpc>
+              <a:spcBef>
+                <a:spcPts val="500"/>
+              </a:spcBef>
+              <a:buFont typeface="Arial" panose="020B0604020202020204" pitchFamily="34" charset="0"/>
+              <a:buChar char="•"/>
+              <a:defRPr sz="1800" kern="1200">
+                <a:solidFill>
+                  <a:schemeClr val="dk1"/>
+                </a:solidFill>
+                <a:latin typeface="+mn-lt"/>
+                <a:ea typeface="+mn-ea"/>
+                <a:cs typeface="+mn-cs"/>
+              </a:defRPr>
+            </a:lvl9pPr>
+          </a:lstStyle>
+          <a:p>
+            <a:pPr marL="0" indent="0" algn="ctr">
+              <a:buFont typeface="Arial" panose="020B0604020202020204" pitchFamily="34" charset="0"/>
+              <a:buNone/>
+            </a:pPr>
+            <a:r>
+              <a:rPr lang="en-IN" sz="1800" dirty="0"/>
+              <a:t>Sector Analysis</a:t>
+            </a:r>
+          </a:p>
+        </p:txBody>
+      </p:sp>
+      <p:sp>
+        <p:nvSpPr>
+          <p:cNvPr id="9" name="Rectangle 8">
+            <a:extLst>
+              <a:ext uri="{FF2B5EF4-FFF2-40B4-BE49-F238E27FC236}">
+                <a16:creationId xmlns:a16="http://schemas.microsoft.com/office/drawing/2014/main" id="{F77EA907-B617-4223-B9FF-FBE2B30410BD}"/>
+              </a:ext>
+            </a:extLst>
+          </p:cNvPr>
+          <p:cNvSpPr/>
+          <p:nvPr/>
+        </p:nvSpPr>
+        <p:spPr>
+          <a:xfrm>
+            <a:off x="812007" y="3012914"/>
+            <a:ext cx="1879600" cy="3434083"/>
+          </a:xfrm>
+          <a:prstGeom prst="rect">
+            <a:avLst/>
+          </a:prstGeom>
+        </p:spPr>
+        <p:style>
+          <a:lnRef idx="2">
+            <a:schemeClr val="accent6"/>
+          </a:lnRef>
+          <a:fillRef idx="1">
+            <a:schemeClr val="lt1"/>
+          </a:fillRef>
+          <a:effectRef idx="0">
+            <a:schemeClr val="accent6"/>
+          </a:effectRef>
+          <a:fontRef idx="minor">
+            <a:schemeClr val="dk1"/>
+          </a:fontRef>
+        </p:style>
+        <p:txBody>
+          <a:bodyPr rtlCol="0" anchor="ctr"/>
+          <a:lstStyle/>
+          <a:p>
+            <a:pPr marL="285750" indent="-285750">
+              <a:buFont typeface="Arial" panose="020B0604020202020204" pitchFamily="34" charset="0"/>
+              <a:buChar char="•"/>
+            </a:pPr>
+            <a:r>
+              <a:rPr lang="en-IN" dirty="0"/>
+              <a:t>Merge the companies and rounds </a:t>
+            </a:r>
+            <a:r>
+              <a:rPr lang="en-IN" dirty="0" err="1"/>
+              <a:t>dataframes</a:t>
+            </a:r>
+            <a:endParaRPr lang="en-IN" dirty="0"/>
+          </a:p>
+          <a:p>
+            <a:pPr marL="285750" indent="-285750">
+              <a:buFont typeface="Arial" panose="020B0604020202020204" pitchFamily="34" charset="0"/>
+              <a:buChar char="•"/>
+            </a:pPr>
+            <a:r>
+              <a:rPr lang="en-IN" dirty="0"/>
+              <a:t>Drop unnecessary columns</a:t>
+            </a:r>
+          </a:p>
+          <a:p>
+            <a:pPr marL="285750" indent="-285750">
+              <a:buFont typeface="Arial" panose="020B0604020202020204" pitchFamily="34" charset="0"/>
+              <a:buChar char="•"/>
+            </a:pPr>
+            <a:r>
+              <a:rPr lang="en-IN" dirty="0"/>
+              <a:t>Remove missing data and impute values </a:t>
+            </a:r>
+          </a:p>
+        </p:txBody>
+      </p:sp>
+      <p:sp>
+        <p:nvSpPr>
+          <p:cNvPr id="10" name="Rectangle 9">
+            <a:extLst>
+              <a:ext uri="{FF2B5EF4-FFF2-40B4-BE49-F238E27FC236}">
+                <a16:creationId xmlns:a16="http://schemas.microsoft.com/office/drawing/2014/main" id="{4BC24677-6024-4879-9C88-C41E97E4932E}"/>
+              </a:ext>
+            </a:extLst>
+          </p:cNvPr>
+          <p:cNvSpPr/>
+          <p:nvPr/>
+        </p:nvSpPr>
+        <p:spPr>
+          <a:xfrm>
+            <a:off x="3733800" y="3016490"/>
+            <a:ext cx="1879600" cy="3403600"/>
+          </a:xfrm>
+          <a:prstGeom prst="rect">
+            <a:avLst/>
+          </a:prstGeom>
+        </p:spPr>
+        <p:style>
+          <a:lnRef idx="2">
+            <a:schemeClr val="accent6"/>
+          </a:lnRef>
+          <a:fillRef idx="1">
+            <a:schemeClr val="lt1"/>
+          </a:fillRef>
+          <a:effectRef idx="0">
+            <a:schemeClr val="accent6"/>
+          </a:effectRef>
+          <a:fontRef idx="minor">
+            <a:schemeClr val="dk1"/>
+          </a:fontRef>
+        </p:style>
+        <p:txBody>
+          <a:bodyPr rtlCol="0" anchor="ctr"/>
+          <a:lstStyle/>
+          <a:p>
+            <a:pPr marL="285750" indent="-285750">
+              <a:buFont typeface="Arial" panose="020B0604020202020204" pitchFamily="34" charset="0"/>
+              <a:buChar char="•"/>
+            </a:pPr>
+            <a:r>
+              <a:rPr lang="en-IN" dirty="0"/>
+              <a:t>Focusing on major 4 types</a:t>
+            </a:r>
+          </a:p>
+          <a:p>
+            <a:pPr marL="285750" indent="-285750">
+              <a:buFont typeface="Arial" panose="020B0604020202020204" pitchFamily="34" charset="0"/>
+              <a:buChar char="•"/>
+            </a:pPr>
+            <a:r>
+              <a:rPr lang="en-IN" dirty="0"/>
+              <a:t>Getting the median values across all investments</a:t>
+            </a:r>
+          </a:p>
+          <a:p>
+            <a:pPr marL="285750" indent="-285750">
+              <a:buFont typeface="Arial" panose="020B0604020202020204" pitchFamily="34" charset="0"/>
+              <a:buChar char="•"/>
+            </a:pPr>
+            <a:r>
+              <a:rPr lang="en-IN" dirty="0"/>
+              <a:t>Choose the most chosen type(FT) which falls under our budget</a:t>
+            </a:r>
+          </a:p>
+        </p:txBody>
+      </p:sp>
+      <p:sp>
+        <p:nvSpPr>
+          <p:cNvPr id="11" name="Rectangle 10">
+            <a:extLst>
+              <a:ext uri="{FF2B5EF4-FFF2-40B4-BE49-F238E27FC236}">
+                <a16:creationId xmlns:a16="http://schemas.microsoft.com/office/drawing/2014/main" id="{FAC2A728-00CB-4167-B841-3BEFBFF7120B}"/>
+              </a:ext>
+            </a:extLst>
+          </p:cNvPr>
+          <p:cNvSpPr/>
+          <p:nvPr/>
+        </p:nvSpPr>
+        <p:spPr>
+          <a:xfrm>
+            <a:off x="6462713" y="3051731"/>
+            <a:ext cx="1879600" cy="3403600"/>
+          </a:xfrm>
+          <a:prstGeom prst="rect">
+            <a:avLst/>
+          </a:prstGeom>
+        </p:spPr>
+        <p:style>
+          <a:lnRef idx="2">
+            <a:schemeClr val="accent6"/>
+          </a:lnRef>
+          <a:fillRef idx="1">
+            <a:schemeClr val="lt1"/>
+          </a:fillRef>
+          <a:effectRef idx="0">
+            <a:schemeClr val="accent6"/>
+          </a:effectRef>
+          <a:fontRef idx="minor">
+            <a:schemeClr val="dk1"/>
+          </a:fontRef>
+        </p:style>
+        <p:txBody>
+          <a:bodyPr rtlCol="0" anchor="ctr"/>
+          <a:lstStyle/>
+          <a:p>
+            <a:pPr marL="285750" indent="-285750">
+              <a:buFont typeface="Arial" panose="020B0604020202020204" pitchFamily="34" charset="0"/>
+              <a:buChar char="•"/>
+            </a:pPr>
+            <a:r>
+              <a:rPr lang="en-IN" sz="1600" dirty="0"/>
+              <a:t>Within the selected FT and budget Range , get the top9 countries where most investments are done</a:t>
+            </a:r>
+          </a:p>
+          <a:p>
+            <a:pPr marL="285750" indent="-285750">
+              <a:buFont typeface="Arial" panose="020B0604020202020204" pitchFamily="34" charset="0"/>
+              <a:buChar char="•"/>
+            </a:pPr>
+            <a:r>
+              <a:rPr lang="en-IN" sz="1600" dirty="0"/>
+              <a:t>Select the top three countries , English Spoken </a:t>
+            </a:r>
+          </a:p>
+        </p:txBody>
+      </p:sp>
+      <p:sp>
+        <p:nvSpPr>
+          <p:cNvPr id="12" name="Rectangle 11">
+            <a:extLst>
+              <a:ext uri="{FF2B5EF4-FFF2-40B4-BE49-F238E27FC236}">
+                <a16:creationId xmlns:a16="http://schemas.microsoft.com/office/drawing/2014/main" id="{B3664B3B-6D40-48F0-8769-ACBA110ECDFE}"/>
+              </a:ext>
+            </a:extLst>
+          </p:cNvPr>
+          <p:cNvSpPr/>
+          <p:nvPr/>
+        </p:nvSpPr>
+        <p:spPr>
+          <a:xfrm>
+            <a:off x="9318626" y="3051731"/>
+            <a:ext cx="1879600" cy="3403600"/>
+          </a:xfrm>
+          <a:prstGeom prst="rect">
+            <a:avLst/>
+          </a:prstGeom>
+        </p:spPr>
+        <p:style>
+          <a:lnRef idx="2">
+            <a:schemeClr val="accent6"/>
+          </a:lnRef>
+          <a:fillRef idx="1">
+            <a:schemeClr val="lt1"/>
+          </a:fillRef>
+          <a:effectRef idx="0">
+            <a:schemeClr val="accent6"/>
+          </a:effectRef>
+          <a:fontRef idx="minor">
+            <a:schemeClr val="dk1"/>
+          </a:fontRef>
+        </p:style>
+        <p:txBody>
+          <a:bodyPr rtlCol="0" anchor="ctr"/>
+          <a:lstStyle/>
+          <a:p>
+            <a:pPr marL="285750" indent="-285750">
+              <a:buFont typeface="Arial" panose="020B0604020202020204" pitchFamily="34" charset="0"/>
+              <a:buChar char="•"/>
+            </a:pPr>
+            <a:r>
+              <a:rPr lang="en-IN" sz="1600" dirty="0"/>
+              <a:t>Match primary sectors with one of the 8 main sectors</a:t>
+            </a:r>
+          </a:p>
+          <a:p>
+            <a:pPr marL="285750" indent="-285750">
+              <a:buFont typeface="Arial" panose="020B0604020202020204" pitchFamily="34" charset="0"/>
+              <a:buChar char="•"/>
+            </a:pPr>
+            <a:r>
+              <a:rPr lang="en-IN" sz="1600" dirty="0"/>
+              <a:t>Map sectors manually for missing mappings</a:t>
+            </a:r>
+          </a:p>
+          <a:p>
+            <a:pPr marL="285750" indent="-285750">
+              <a:buFont typeface="Arial" panose="020B0604020202020204" pitchFamily="34" charset="0"/>
+              <a:buChar char="•"/>
+            </a:pPr>
+            <a:r>
+              <a:rPr lang="en-IN" sz="1600" dirty="0"/>
+              <a:t>Find top 3 sectors in these 3 countries based on the investment counts</a:t>
+            </a:r>
+          </a:p>
+        </p:txBody>
+      </p:sp>
+      <p:cxnSp>
+        <p:nvCxnSpPr>
+          <p:cNvPr id="14" name="Straight Arrow Connector 13">
+            <a:extLst>
+              <a:ext uri="{FF2B5EF4-FFF2-40B4-BE49-F238E27FC236}">
+                <a16:creationId xmlns:a16="http://schemas.microsoft.com/office/drawing/2014/main" id="{7FB226F9-3E4D-4DC2-8927-59F66F226BBB}"/>
+              </a:ext>
+            </a:extLst>
+          </p:cNvPr>
+          <p:cNvCxnSpPr>
+            <a:stCxn id="2" idx="3"/>
+            <a:endCxn id="4" idx="1"/>
+          </p:cNvCxnSpPr>
+          <p:nvPr/>
+        </p:nvCxnSpPr>
+        <p:spPr>
+          <a:xfrm>
+            <a:off x="2679700" y="2104469"/>
+            <a:ext cx="1130300" cy="0"/>
+          </a:xfrm>
+          <a:prstGeom prst="straightConnector1">
+            <a:avLst/>
+          </a:prstGeom>
+          <a:ln>
+            <a:tailEnd type="triangle"/>
+          </a:ln>
+        </p:spPr>
+        <p:style>
+          <a:lnRef idx="1">
+            <a:schemeClr val="accent1"/>
+          </a:lnRef>
+          <a:fillRef idx="0">
+            <a:schemeClr val="accent1"/>
+          </a:fillRef>
+          <a:effectRef idx="0">
+            <a:schemeClr val="accent1"/>
+          </a:effectRef>
+          <a:fontRef idx="minor">
+            <a:schemeClr val="tx1"/>
+          </a:fontRef>
+        </p:style>
+      </p:cxnSp>
+      <p:cxnSp>
+        <p:nvCxnSpPr>
+          <p:cNvPr id="16" name="Straight Arrow Connector 15">
+            <a:extLst>
+              <a:ext uri="{FF2B5EF4-FFF2-40B4-BE49-F238E27FC236}">
+                <a16:creationId xmlns:a16="http://schemas.microsoft.com/office/drawing/2014/main" id="{6A8E6096-88DA-44C6-9FF3-F9FC0C491271}"/>
+              </a:ext>
+            </a:extLst>
+          </p:cNvPr>
+          <p:cNvCxnSpPr>
+            <a:stCxn id="4" idx="3"/>
+            <a:endCxn id="7" idx="1"/>
+          </p:cNvCxnSpPr>
+          <p:nvPr/>
+        </p:nvCxnSpPr>
+        <p:spPr>
+          <a:xfrm>
+            <a:off x="5537200" y="2104469"/>
+            <a:ext cx="1001713" cy="0"/>
+          </a:xfrm>
+          <a:prstGeom prst="straightConnector1">
+            <a:avLst/>
+          </a:prstGeom>
+          <a:ln>
+            <a:tailEnd type="triangle"/>
+          </a:ln>
+        </p:spPr>
+        <p:style>
+          <a:lnRef idx="1">
+            <a:schemeClr val="accent1"/>
+          </a:lnRef>
+          <a:fillRef idx="0">
+            <a:schemeClr val="accent1"/>
+          </a:fillRef>
+          <a:effectRef idx="0">
+            <a:schemeClr val="accent1"/>
+          </a:effectRef>
+          <a:fontRef idx="minor">
+            <a:schemeClr val="tx1"/>
+          </a:fontRef>
+        </p:style>
+      </p:cxnSp>
+      <p:cxnSp>
+        <p:nvCxnSpPr>
+          <p:cNvPr id="18" name="Straight Arrow Connector 17">
+            <a:extLst>
+              <a:ext uri="{FF2B5EF4-FFF2-40B4-BE49-F238E27FC236}">
+                <a16:creationId xmlns:a16="http://schemas.microsoft.com/office/drawing/2014/main" id="{950D453E-4576-40EA-8EB2-1C6234B4498D}"/>
+              </a:ext>
+            </a:extLst>
+          </p:cNvPr>
+          <p:cNvCxnSpPr>
+            <a:stCxn id="7" idx="3"/>
+            <a:endCxn id="8" idx="1"/>
+          </p:cNvCxnSpPr>
+          <p:nvPr/>
+        </p:nvCxnSpPr>
+        <p:spPr>
+          <a:xfrm flipV="1">
+            <a:off x="8266113" y="2104468"/>
+            <a:ext cx="1130300" cy="1"/>
+          </a:xfrm>
+          <a:prstGeom prst="straightConnector1">
+            <a:avLst/>
+          </a:prstGeom>
+          <a:ln>
+            <a:tailEnd type="triangle"/>
+          </a:ln>
+        </p:spPr>
+        <p:style>
+          <a:lnRef idx="1">
+            <a:schemeClr val="accent1"/>
+          </a:lnRef>
+          <a:fillRef idx="0">
+            <a:schemeClr val="accent1"/>
+          </a:fillRef>
+          <a:effectRef idx="0">
+            <a:schemeClr val="accent1"/>
+          </a:effectRef>
+          <a:fontRef idx="minor">
+            <a:schemeClr val="tx1"/>
+          </a:fontRef>
+        </p:style>
+      </p:cxnSp>
+      <p:sp>
+        <p:nvSpPr>
+          <p:cNvPr id="20" name="Arrow: Down 19">
+            <a:extLst>
+              <a:ext uri="{FF2B5EF4-FFF2-40B4-BE49-F238E27FC236}">
+                <a16:creationId xmlns:a16="http://schemas.microsoft.com/office/drawing/2014/main" id="{68050C21-10C5-4570-89F5-3F7A41946246}"/>
+              </a:ext>
+            </a:extLst>
+          </p:cNvPr>
+          <p:cNvSpPr/>
+          <p:nvPr/>
+        </p:nvSpPr>
+        <p:spPr>
+          <a:xfrm>
+            <a:off x="1588294" y="2532536"/>
+            <a:ext cx="368300" cy="480377"/>
+          </a:xfrm>
+          <a:prstGeom prst="downArrow">
+            <a:avLst/>
+          </a:prstGeom>
+        </p:spPr>
+        <p:style>
+          <a:lnRef idx="2">
+            <a:schemeClr val="accent1">
+              <a:shade val="50000"/>
+            </a:schemeClr>
+          </a:lnRef>
+          <a:fillRef idx="1">
+            <a:schemeClr val="accent1"/>
+          </a:fillRef>
+          <a:effectRef idx="0">
+            <a:schemeClr val="accent1"/>
+          </a:effectRef>
+          <a:fontRef idx="minor">
+            <a:schemeClr val="lt1"/>
+          </a:fontRef>
+        </p:style>
+        <p:txBody>
+          <a:bodyPr rtlCol="0" anchor="ctr"/>
+          <a:lstStyle/>
+          <a:p>
+            <a:pPr algn="ctr"/>
+            <a:endParaRPr lang="en-IN"/>
+          </a:p>
+        </p:txBody>
+      </p:sp>
+      <p:sp>
+        <p:nvSpPr>
+          <p:cNvPr id="21" name="Arrow: Down 20">
+            <a:extLst>
+              <a:ext uri="{FF2B5EF4-FFF2-40B4-BE49-F238E27FC236}">
+                <a16:creationId xmlns:a16="http://schemas.microsoft.com/office/drawing/2014/main" id="{9F211AA2-71E4-4BB2-BB24-B2BF019ED8B1}"/>
+              </a:ext>
+            </a:extLst>
+          </p:cNvPr>
+          <p:cNvSpPr/>
+          <p:nvPr/>
+        </p:nvSpPr>
+        <p:spPr>
+          <a:xfrm>
+            <a:off x="4501357" y="2517296"/>
+            <a:ext cx="368300" cy="499194"/>
+          </a:xfrm>
+          <a:prstGeom prst="downArrow">
+            <a:avLst/>
+          </a:prstGeom>
+        </p:spPr>
+        <p:style>
+          <a:lnRef idx="2">
+            <a:schemeClr val="accent1">
+              <a:shade val="50000"/>
+            </a:schemeClr>
+          </a:lnRef>
+          <a:fillRef idx="1">
+            <a:schemeClr val="accent1"/>
+          </a:fillRef>
+          <a:effectRef idx="0">
+            <a:schemeClr val="accent1"/>
+          </a:effectRef>
+          <a:fontRef idx="minor">
+            <a:schemeClr val="lt1"/>
+          </a:fontRef>
+        </p:style>
+        <p:txBody>
+          <a:bodyPr rtlCol="0" anchor="ctr"/>
+          <a:lstStyle/>
+          <a:p>
+            <a:pPr algn="ctr"/>
+            <a:endParaRPr lang="en-IN"/>
+          </a:p>
+        </p:txBody>
+      </p:sp>
+      <p:sp>
+        <p:nvSpPr>
+          <p:cNvPr id="22" name="Arrow: Down 21">
+            <a:extLst>
+              <a:ext uri="{FF2B5EF4-FFF2-40B4-BE49-F238E27FC236}">
+                <a16:creationId xmlns:a16="http://schemas.microsoft.com/office/drawing/2014/main" id="{969201BA-005A-4D57-B380-5B8980E4C529}"/>
+              </a:ext>
+            </a:extLst>
+          </p:cNvPr>
+          <p:cNvSpPr/>
+          <p:nvPr/>
+        </p:nvSpPr>
+        <p:spPr>
+          <a:xfrm>
+            <a:off x="7218363" y="2532537"/>
+            <a:ext cx="368300" cy="519194"/>
+          </a:xfrm>
+          <a:prstGeom prst="downArrow">
+            <a:avLst/>
+          </a:prstGeom>
+        </p:spPr>
+        <p:style>
+          <a:lnRef idx="2">
+            <a:schemeClr val="accent1">
+              <a:shade val="50000"/>
+            </a:schemeClr>
+          </a:lnRef>
+          <a:fillRef idx="1">
+            <a:schemeClr val="accent1"/>
+          </a:fillRef>
+          <a:effectRef idx="0">
+            <a:schemeClr val="accent1"/>
+          </a:effectRef>
+          <a:fontRef idx="minor">
+            <a:schemeClr val="lt1"/>
+          </a:fontRef>
+        </p:style>
+        <p:txBody>
+          <a:bodyPr rtlCol="0" anchor="ctr"/>
+          <a:lstStyle/>
+          <a:p>
+            <a:pPr algn="ctr"/>
+            <a:endParaRPr lang="en-IN"/>
+          </a:p>
+        </p:txBody>
+      </p:sp>
+      <p:sp>
+        <p:nvSpPr>
+          <p:cNvPr id="23" name="Arrow: Down 22">
+            <a:extLst>
+              <a:ext uri="{FF2B5EF4-FFF2-40B4-BE49-F238E27FC236}">
+                <a16:creationId xmlns:a16="http://schemas.microsoft.com/office/drawing/2014/main" id="{640FC772-8180-4060-BAA9-D0951BDD5B8B}"/>
+              </a:ext>
+            </a:extLst>
+          </p:cNvPr>
+          <p:cNvSpPr/>
+          <p:nvPr/>
+        </p:nvSpPr>
+        <p:spPr>
+          <a:xfrm>
+            <a:off x="10081986" y="2517295"/>
+            <a:ext cx="368300" cy="534435"/>
+          </a:xfrm>
+          <a:prstGeom prst="downArrow">
+            <a:avLst/>
+          </a:prstGeom>
+        </p:spPr>
+        <p:style>
+          <a:lnRef idx="2">
+            <a:schemeClr val="accent1">
+              <a:shade val="50000"/>
+            </a:schemeClr>
+          </a:lnRef>
+          <a:fillRef idx="1">
+            <a:schemeClr val="accent1"/>
+          </a:fillRef>
+          <a:effectRef idx="0">
+            <a:schemeClr val="accent1"/>
+          </a:effectRef>
+          <a:fontRef idx="minor">
+            <a:schemeClr val="lt1"/>
+          </a:fontRef>
+        </p:style>
+        <p:txBody>
+          <a:bodyPr rtlCol="0" anchor="ctr"/>
+          <a:lstStyle/>
+          <a:p>
+            <a:pPr algn="ctr"/>
+            <a:endParaRPr lang="en-IN"/>
           </a:p>
         </p:txBody>
       </p:sp>
@@ -3810,12 +5283,9 @@
           <a:p>
             <a:r>
               <a:rPr lang="en-IN" b="1" dirty="0"/>
-              <a:t> </a:t>
-            </a:r>
-            <a:r>
-              <a:rPr lang="en-IN" sz="2800" dirty="0"/>
-              <a:t>&lt;Analysis&gt;</a:t>
-            </a:r>
+              <a:t>Data Cleaning</a:t>
+            </a:r>
+            <a:endParaRPr lang="en-IN" sz="2800" dirty="0"/>
           </a:p>
         </p:txBody>
       </p:sp>
@@ -3836,10 +5306,101 @@
           </a:bodyPr>
           <a:lstStyle/>
           <a:p>
-            <a:pPr marL="0" indent="0">
-              <a:buNone/>
-            </a:pPr>
-            <a:endParaRPr lang="en-IN" sz="1400" dirty="0"/>
+            <a:r>
+              <a:rPr lang="en-US" sz="1800" dirty="0"/>
+              <a:t>There are 66368 unique company permalinks in companies </a:t>
+            </a:r>
+            <a:r>
+              <a:rPr lang="en-US" sz="1800" dirty="0" err="1"/>
+              <a:t>dataframe</a:t>
+            </a:r>
+            <a:r>
+              <a:rPr lang="en-US" sz="1800" dirty="0"/>
+              <a:t>.</a:t>
+            </a:r>
+          </a:p>
+          <a:p>
+            <a:r>
+              <a:rPr lang="en-US" sz="1800" dirty="0"/>
+              <a:t>There are 90247 unique permalinks out of 114949 in the rounds </a:t>
+            </a:r>
+            <a:r>
+              <a:rPr lang="en-US" sz="1800" dirty="0" err="1"/>
+              <a:t>dataframe</a:t>
+            </a:r>
+            <a:r>
+              <a:rPr lang="en-US" sz="1800" dirty="0"/>
+              <a:t>.</a:t>
+            </a:r>
+          </a:p>
+          <a:p>
+            <a:r>
+              <a:rPr lang="en-US" sz="1800" dirty="0"/>
+              <a:t>There are 7 companies which are there in rounds df but not companies </a:t>
+            </a:r>
+            <a:r>
+              <a:rPr lang="en-US" sz="1800" dirty="0" err="1"/>
+              <a:t>dataframe</a:t>
+            </a:r>
+            <a:endParaRPr lang="en-US" sz="1800" dirty="0"/>
+          </a:p>
+          <a:p>
+            <a:r>
+              <a:rPr lang="en-US" sz="1800" dirty="0"/>
+              <a:t>We have 114942 entries in </a:t>
+            </a:r>
+            <a:r>
+              <a:rPr lang="en-US" sz="1800" dirty="0" err="1"/>
+              <a:t>master_frame</a:t>
+            </a:r>
+            <a:r>
+              <a:rPr lang="en-US" sz="1800" dirty="0"/>
+              <a:t> after performing inner join on rounds and companies df.</a:t>
+            </a:r>
+          </a:p>
+          <a:p>
+            <a:r>
+              <a:rPr lang="en-IN" sz="1800" dirty="0"/>
+              <a:t>There are 17%(~20K records) approx. missing values in the </a:t>
+            </a:r>
+            <a:r>
+              <a:rPr lang="en-IN" sz="1800" dirty="0" err="1"/>
+              <a:t>raised_amount_usd</a:t>
+            </a:r>
+            <a:r>
+              <a:rPr lang="en-IN" sz="1800" dirty="0"/>
+              <a:t> column.</a:t>
+            </a:r>
+          </a:p>
+          <a:p>
+            <a:r>
+              <a:rPr lang="en-IN" sz="1800" dirty="0"/>
+              <a:t>There are around 6%(5.8K records) missing the country code. </a:t>
+            </a:r>
+          </a:p>
+          <a:p>
+            <a:r>
+              <a:rPr lang="en-IN" sz="1800" dirty="0"/>
+              <a:t>There are around 580 records which are missing the primary sector field. </a:t>
+            </a:r>
+          </a:p>
+          <a:p>
+            <a:r>
+              <a:rPr lang="en-IN" sz="1800" dirty="0"/>
+              <a:t>Dropping all the records in the above three points.</a:t>
+            </a:r>
+          </a:p>
+          <a:p>
+            <a:r>
+              <a:rPr lang="en-IN" sz="1800" dirty="0"/>
+              <a:t>Records not falling in the major 4 FTs were dropped. </a:t>
+            </a:r>
+          </a:p>
+          <a:p>
+            <a:r>
+              <a:rPr lang="en-IN" sz="1800" dirty="0"/>
+              <a:t>39818 records (34.65%) were dropped out of 114,949.</a:t>
+            </a:r>
           </a:p>
         </p:txBody>
       </p:sp>
@@ -3890,36 +5451,600 @@
           <a:p>
             <a:r>
               <a:rPr lang="en-IN" b="1" dirty="0"/>
-              <a:t> </a:t>
-            </a:r>
-            <a:r>
-              <a:rPr lang="en-IN" sz="2800" dirty="0"/>
-              <a:t>&lt;Analysis&gt;</a:t>
-            </a:r>
-          </a:p>
-        </p:txBody>
-      </p:sp>
-      <p:sp>
-        <p:nvSpPr>
-          <p:cNvPr id="3" name="Content Placeholder 2"/>
-          <p:cNvSpPr>
-            <a:spLocks noGrp="1"/>
-          </p:cNvSpPr>
+              <a:t>Fund Type Analysis</a:t>
+            </a:r>
+            <a:endParaRPr lang="en-IN" sz="2800" dirty="0"/>
+          </a:p>
+        </p:txBody>
+      </p:sp>
+      <p:graphicFrame>
+        <p:nvGraphicFramePr>
+          <p:cNvPr id="5" name="Table 5">
+            <a:extLst>
+              <a:ext uri="{FF2B5EF4-FFF2-40B4-BE49-F238E27FC236}">
+                <a16:creationId xmlns:a16="http://schemas.microsoft.com/office/drawing/2014/main" id="{75DDED1B-4B0B-4024-96EC-8D87D85FC4DF}"/>
+              </a:ext>
+            </a:extLst>
+          </p:cNvPr>
+          <p:cNvGraphicFramePr>
+            <a:graphicFrameLocks noGrp="1"/>
+          </p:cNvGraphicFramePr>
           <p:nvPr>
             <p:ph idx="1"/>
-          </p:nvPr>
-        </p:nvSpPr>
-        <p:spPr/>
-        <p:txBody>
-          <a:bodyPr>
-            <a:normAutofit/>
+            <p:extLst>
+              <p:ext uri="{D42A27DB-BD31-4B8C-83A1-F6EECF244321}">
+                <p14:modId xmlns:p14="http://schemas.microsoft.com/office/powerpoint/2010/main" val="1405927564"/>
+              </p:ext>
+            </p:extLst>
+          </p:nvPr>
+        </p:nvGraphicFramePr>
+        <p:xfrm>
+          <a:off x="469900" y="1600200"/>
+          <a:ext cx="4243388" cy="1828800"/>
+        </p:xfrm>
+        <a:graphic>
+          <a:graphicData uri="http://schemas.openxmlformats.org/drawingml/2006/table">
+            <a:tbl>
+              <a:tblPr firstRow="1" bandRow="1">
+                <a:tableStyleId>{5C22544A-7EE6-4342-B048-85BDC9FD1C3A}</a:tableStyleId>
+              </a:tblPr>
+              <a:tblGrid>
+                <a:gridCol w="2121694">
+                  <a:extLst>
+                    <a:ext uri="{9D8B030D-6E8A-4147-A177-3AD203B41FA5}">
+                      <a16:colId xmlns:a16="http://schemas.microsoft.com/office/drawing/2014/main" val="529947729"/>
+                    </a:ext>
+                  </a:extLst>
+                </a:gridCol>
+                <a:gridCol w="2121694">
+                  <a:extLst>
+                    <a:ext uri="{9D8B030D-6E8A-4147-A177-3AD203B41FA5}">
+                      <a16:colId xmlns:a16="http://schemas.microsoft.com/office/drawing/2014/main" val="589324746"/>
+                    </a:ext>
+                  </a:extLst>
+                </a:gridCol>
+              </a:tblGrid>
+              <a:tr h="299720">
+                <a:tc>
+                  <a:txBody>
+                    <a:bodyPr/>
+                    <a:lstStyle/>
+                    <a:p>
+                      <a:r>
+                        <a:rPr lang="en-IN" dirty="0"/>
+                        <a:t>Fund Type</a:t>
+                      </a:r>
+                    </a:p>
+                  </a:txBody>
+                  <a:tcPr/>
+                </a:tc>
+                <a:tc>
+                  <a:txBody>
+                    <a:bodyPr/>
+                    <a:lstStyle/>
+                    <a:p>
+                      <a:r>
+                        <a:rPr lang="en-IN" dirty="0"/>
+                        <a:t>Median Value</a:t>
+                      </a:r>
+                    </a:p>
+                  </a:txBody>
+                  <a:tcPr/>
+                </a:tc>
+                <a:extLst>
+                  <a:ext uri="{0D108BD9-81ED-4DB2-BD59-A6C34878D82A}">
+                    <a16:rowId xmlns:a16="http://schemas.microsoft.com/office/drawing/2014/main" val="1125472186"/>
+                  </a:ext>
+                </a:extLst>
+              </a:tr>
+              <a:tr h="299720">
+                <a:tc>
+                  <a:txBody>
+                    <a:bodyPr/>
+                    <a:lstStyle/>
+                    <a:p>
+                      <a:r>
+                        <a:rPr lang="en-IN" dirty="0"/>
+                        <a:t>Seed</a:t>
+                      </a:r>
+                    </a:p>
+                  </a:txBody>
+                  <a:tcPr/>
+                </a:tc>
+                <a:tc>
+                  <a:txBody>
+                    <a:bodyPr/>
+                    <a:lstStyle/>
+                    <a:p>
+                      <a:r>
+                        <a:rPr lang="en-IN" dirty="0"/>
+                        <a:t>300000 USD</a:t>
+                      </a:r>
+                    </a:p>
+                  </a:txBody>
+                  <a:tcPr/>
+                </a:tc>
+                <a:extLst>
+                  <a:ext uri="{0D108BD9-81ED-4DB2-BD59-A6C34878D82A}">
+                    <a16:rowId xmlns:a16="http://schemas.microsoft.com/office/drawing/2014/main" val="1107340623"/>
+                  </a:ext>
+                </a:extLst>
+              </a:tr>
+              <a:tr h="299720">
+                <a:tc>
+                  <a:txBody>
+                    <a:bodyPr/>
+                    <a:lstStyle/>
+                    <a:p>
+                      <a:r>
+                        <a:rPr lang="en-IN" dirty="0"/>
+                        <a:t>Angel</a:t>
+                      </a:r>
+                    </a:p>
+                  </a:txBody>
+                  <a:tcPr/>
+                </a:tc>
+                <a:tc>
+                  <a:txBody>
+                    <a:bodyPr/>
+                    <a:lstStyle/>
+                    <a:p>
+                      <a:r>
+                        <a:rPr lang="en-IN" dirty="0"/>
+                        <a:t>414906 USD</a:t>
+                      </a:r>
+                    </a:p>
+                  </a:txBody>
+                  <a:tcPr/>
+                </a:tc>
+                <a:extLst>
+                  <a:ext uri="{0D108BD9-81ED-4DB2-BD59-A6C34878D82A}">
+                    <a16:rowId xmlns:a16="http://schemas.microsoft.com/office/drawing/2014/main" val="3420976317"/>
+                  </a:ext>
+                </a:extLst>
+              </a:tr>
+              <a:tr h="299720">
+                <a:tc>
+                  <a:txBody>
+                    <a:bodyPr/>
+                    <a:lstStyle/>
+                    <a:p>
+                      <a:r>
+                        <a:rPr lang="en-IN" dirty="0">
+                          <a:solidFill>
+                            <a:schemeClr val="accent6">
+                              <a:lumMod val="50000"/>
+                            </a:schemeClr>
+                          </a:solidFill>
+                        </a:rPr>
+                        <a:t>Venture</a:t>
+                      </a:r>
+                    </a:p>
+                  </a:txBody>
+                  <a:tcPr/>
+                </a:tc>
+                <a:tc>
+                  <a:txBody>
+                    <a:bodyPr/>
+                    <a:lstStyle/>
+                    <a:p>
+                      <a:r>
+                        <a:rPr lang="en-IN" dirty="0">
+                          <a:solidFill>
+                            <a:schemeClr val="accent6">
+                              <a:lumMod val="50000"/>
+                            </a:schemeClr>
+                          </a:solidFill>
+                        </a:rPr>
+                        <a:t>5M USD</a:t>
+                      </a:r>
+                    </a:p>
+                  </a:txBody>
+                  <a:tcPr/>
+                </a:tc>
+                <a:extLst>
+                  <a:ext uri="{0D108BD9-81ED-4DB2-BD59-A6C34878D82A}">
+                    <a16:rowId xmlns:a16="http://schemas.microsoft.com/office/drawing/2014/main" val="3944222365"/>
+                  </a:ext>
+                </a:extLst>
+              </a:tr>
+              <a:tr h="299720">
+                <a:tc>
+                  <a:txBody>
+                    <a:bodyPr/>
+                    <a:lstStyle/>
+                    <a:p>
+                      <a:r>
+                        <a:rPr lang="en-IN" dirty="0"/>
+                        <a:t>Private Equity</a:t>
+                      </a:r>
+                    </a:p>
+                  </a:txBody>
+                  <a:tcPr/>
+                </a:tc>
+                <a:tc>
+                  <a:txBody>
+                    <a:bodyPr/>
+                    <a:lstStyle/>
+                    <a:p>
+                      <a:r>
+                        <a:rPr lang="en-IN" dirty="0"/>
+                        <a:t>20M USD</a:t>
+                      </a:r>
+                    </a:p>
+                  </a:txBody>
+                  <a:tcPr/>
+                </a:tc>
+                <a:extLst>
+                  <a:ext uri="{0D108BD9-81ED-4DB2-BD59-A6C34878D82A}">
+                    <a16:rowId xmlns:a16="http://schemas.microsoft.com/office/drawing/2014/main" val="35691838"/>
+                  </a:ext>
+                </a:extLst>
+              </a:tr>
+            </a:tbl>
+          </a:graphicData>
+        </a:graphic>
+      </p:graphicFrame>
+      <p:sp>
+        <p:nvSpPr>
+          <p:cNvPr id="8" name="TextBox 7">
+            <a:extLst>
+              <a:ext uri="{FF2B5EF4-FFF2-40B4-BE49-F238E27FC236}">
+                <a16:creationId xmlns:a16="http://schemas.microsoft.com/office/drawing/2014/main" id="{4C1193DA-3C45-4F4B-B76A-3D19F471C436}"/>
+              </a:ext>
+            </a:extLst>
+          </p:cNvPr>
+          <p:cNvSpPr txBox="1"/>
+          <p:nvPr/>
+        </p:nvSpPr>
+        <p:spPr>
+          <a:xfrm>
+            <a:off x="6210300" y="1676400"/>
+            <a:ext cx="5511800" cy="1477328"/>
+          </a:xfrm>
+          <a:prstGeom prst="rect">
+            <a:avLst/>
+          </a:prstGeom>
+          <a:noFill/>
+        </p:spPr>
+        <p:txBody>
+          <a:bodyPr wrap="square" rtlCol="0">
+            <a:spAutoFit/>
           </a:bodyPr>
           <a:lstStyle/>
           <a:p>
-            <a:pPr marL="0" indent="0">
-              <a:buNone/>
+            <a:pPr marL="285750" indent="-285750">
+              <a:buFont typeface="Arial" panose="020B0604020202020204" pitchFamily="34" charset="0"/>
+              <a:buChar char="•"/>
             </a:pPr>
-            <a:endParaRPr lang="en-IN" sz="1400" dirty="0"/>
+            <a:r>
+              <a:rPr lang="en-IN" dirty="0"/>
+              <a:t>We see that private equity is beyond 15M </a:t>
+            </a:r>
+          </a:p>
+          <a:p>
+            <a:pPr marL="285750" indent="-285750">
+              <a:buFont typeface="Arial" panose="020B0604020202020204" pitchFamily="34" charset="0"/>
+              <a:buChar char="•"/>
+            </a:pPr>
+            <a:r>
+              <a:rPr lang="en-IN" dirty="0"/>
+              <a:t>We also see that seed and angel type are way too below our budget border which is 5M</a:t>
+            </a:r>
+          </a:p>
+          <a:p>
+            <a:pPr marL="285750" indent="-285750">
+              <a:buFont typeface="Arial" panose="020B0604020202020204" pitchFamily="34" charset="0"/>
+              <a:buChar char="•"/>
+            </a:pPr>
+            <a:r>
+              <a:rPr lang="en-IN" dirty="0"/>
+              <a:t>Venture is the best suited Investment Fund type.</a:t>
+            </a:r>
+          </a:p>
+          <a:p>
+            <a:pPr marL="285750" indent="-285750">
+              <a:buFont typeface="Arial" panose="020B0604020202020204" pitchFamily="34" charset="0"/>
+              <a:buChar char="•"/>
+            </a:pPr>
+            <a:endParaRPr lang="en-IN" dirty="0"/>
+          </a:p>
+        </p:txBody>
+      </p:sp>
+      <p:graphicFrame>
+        <p:nvGraphicFramePr>
+          <p:cNvPr id="10" name="Table 5">
+            <a:extLst>
+              <a:ext uri="{FF2B5EF4-FFF2-40B4-BE49-F238E27FC236}">
+                <a16:creationId xmlns:a16="http://schemas.microsoft.com/office/drawing/2014/main" id="{DF48902F-0015-49A3-B92C-60680B2E7610}"/>
+              </a:ext>
+            </a:extLst>
+          </p:cNvPr>
+          <p:cNvGraphicFramePr>
+            <a:graphicFrameLocks/>
+          </p:cNvGraphicFramePr>
+          <p:nvPr>
+            <p:extLst>
+              <p:ext uri="{D42A27DB-BD31-4B8C-83A1-F6EECF244321}">
+                <p14:modId xmlns:p14="http://schemas.microsoft.com/office/powerpoint/2010/main" val="4213048479"/>
+              </p:ext>
+            </p:extLst>
+          </p:nvPr>
+        </p:nvGraphicFramePr>
+        <p:xfrm>
+          <a:off x="469900" y="4191158"/>
+          <a:ext cx="4243388" cy="1828800"/>
+        </p:xfrm>
+        <a:graphic>
+          <a:graphicData uri="http://schemas.openxmlformats.org/drawingml/2006/table">
+            <a:tbl>
+              <a:tblPr firstRow="1" bandRow="1">
+                <a:tableStyleId>{5C22544A-7EE6-4342-B048-85BDC9FD1C3A}</a:tableStyleId>
+              </a:tblPr>
+              <a:tblGrid>
+                <a:gridCol w="2121694">
+                  <a:extLst>
+                    <a:ext uri="{9D8B030D-6E8A-4147-A177-3AD203B41FA5}">
+                      <a16:colId xmlns:a16="http://schemas.microsoft.com/office/drawing/2014/main" val="529947729"/>
+                    </a:ext>
+                  </a:extLst>
+                </a:gridCol>
+                <a:gridCol w="2121694">
+                  <a:extLst>
+                    <a:ext uri="{9D8B030D-6E8A-4147-A177-3AD203B41FA5}">
+                      <a16:colId xmlns:a16="http://schemas.microsoft.com/office/drawing/2014/main" val="589324746"/>
+                    </a:ext>
+                  </a:extLst>
+                </a:gridCol>
+              </a:tblGrid>
+              <a:tr h="299720">
+                <a:tc>
+                  <a:txBody>
+                    <a:bodyPr/>
+                    <a:lstStyle/>
+                    <a:p>
+                      <a:r>
+                        <a:rPr lang="en-IN" dirty="0"/>
+                        <a:t>Fund Type</a:t>
+                      </a:r>
+                    </a:p>
+                  </a:txBody>
+                  <a:tcPr/>
+                </a:tc>
+                <a:tc>
+                  <a:txBody>
+                    <a:bodyPr/>
+                    <a:lstStyle/>
+                    <a:p>
+                      <a:r>
+                        <a:rPr lang="en-IN" dirty="0"/>
+                        <a:t>No of investments</a:t>
+                      </a:r>
+                    </a:p>
+                  </a:txBody>
+                  <a:tcPr/>
+                </a:tc>
+                <a:extLst>
+                  <a:ext uri="{0D108BD9-81ED-4DB2-BD59-A6C34878D82A}">
+                    <a16:rowId xmlns:a16="http://schemas.microsoft.com/office/drawing/2014/main" val="1125472186"/>
+                  </a:ext>
+                </a:extLst>
+              </a:tr>
+              <a:tr h="299720">
+                <a:tc>
+                  <a:txBody>
+                    <a:bodyPr/>
+                    <a:lstStyle/>
+                    <a:p>
+                      <a:r>
+                        <a:rPr lang="en-IN" dirty="0"/>
+                        <a:t>Seed</a:t>
+                      </a:r>
+                    </a:p>
+                  </a:txBody>
+                  <a:tcPr/>
+                </a:tc>
+                <a:tc>
+                  <a:txBody>
+                    <a:bodyPr/>
+                    <a:lstStyle/>
+                    <a:p>
+                      <a:r>
+                        <a:rPr lang="en-IN" dirty="0"/>
+                        <a:t>21095</a:t>
+                      </a:r>
+                    </a:p>
+                  </a:txBody>
+                  <a:tcPr/>
+                </a:tc>
+                <a:extLst>
+                  <a:ext uri="{0D108BD9-81ED-4DB2-BD59-A6C34878D82A}">
+                    <a16:rowId xmlns:a16="http://schemas.microsoft.com/office/drawing/2014/main" val="1107340623"/>
+                  </a:ext>
+                </a:extLst>
+              </a:tr>
+              <a:tr h="299720">
+                <a:tc>
+                  <a:txBody>
+                    <a:bodyPr/>
+                    <a:lstStyle/>
+                    <a:p>
+                      <a:r>
+                        <a:rPr lang="en-IN" dirty="0"/>
+                        <a:t>Angel</a:t>
+                      </a:r>
+                    </a:p>
+                  </a:txBody>
+                  <a:tcPr/>
+                </a:tc>
+                <a:tc>
+                  <a:txBody>
+                    <a:bodyPr/>
+                    <a:lstStyle/>
+                    <a:p>
+                      <a:r>
+                        <a:rPr lang="en-IN" dirty="0"/>
+                        <a:t>4400</a:t>
+                      </a:r>
+                    </a:p>
+                  </a:txBody>
+                  <a:tcPr/>
+                </a:tc>
+                <a:extLst>
+                  <a:ext uri="{0D108BD9-81ED-4DB2-BD59-A6C34878D82A}">
+                    <a16:rowId xmlns:a16="http://schemas.microsoft.com/office/drawing/2014/main" val="3420976317"/>
+                  </a:ext>
+                </a:extLst>
+              </a:tr>
+              <a:tr h="299720">
+                <a:tc>
+                  <a:txBody>
+                    <a:bodyPr/>
+                    <a:lstStyle/>
+                    <a:p>
+                      <a:r>
+                        <a:rPr lang="en-IN" dirty="0">
+                          <a:solidFill>
+                            <a:schemeClr val="accent6">
+                              <a:lumMod val="50000"/>
+                            </a:schemeClr>
+                          </a:solidFill>
+                        </a:rPr>
+                        <a:t>Venture</a:t>
+                      </a:r>
+                    </a:p>
+                  </a:txBody>
+                  <a:tcPr/>
+                </a:tc>
+                <a:tc>
+                  <a:txBody>
+                    <a:bodyPr/>
+                    <a:lstStyle/>
+                    <a:p>
+                      <a:r>
+                        <a:rPr lang="en-IN" dirty="0">
+                          <a:solidFill>
+                            <a:schemeClr val="accent6">
+                              <a:lumMod val="50000"/>
+                            </a:schemeClr>
+                          </a:solidFill>
+                        </a:rPr>
+                        <a:t>47809</a:t>
+                      </a:r>
+                    </a:p>
+                  </a:txBody>
+                  <a:tcPr/>
+                </a:tc>
+                <a:extLst>
+                  <a:ext uri="{0D108BD9-81ED-4DB2-BD59-A6C34878D82A}">
+                    <a16:rowId xmlns:a16="http://schemas.microsoft.com/office/drawing/2014/main" val="3944222365"/>
+                  </a:ext>
+                </a:extLst>
+              </a:tr>
+              <a:tr h="299720">
+                <a:tc>
+                  <a:txBody>
+                    <a:bodyPr/>
+                    <a:lstStyle/>
+                    <a:p>
+                      <a:r>
+                        <a:rPr lang="en-IN" dirty="0"/>
+                        <a:t>Private Equity</a:t>
+                      </a:r>
+                    </a:p>
+                  </a:txBody>
+                  <a:tcPr/>
+                </a:tc>
+                <a:tc>
+                  <a:txBody>
+                    <a:bodyPr/>
+                    <a:lstStyle/>
+                    <a:p>
+                      <a:r>
+                        <a:rPr lang="en-IN" dirty="0"/>
+                        <a:t>1820</a:t>
+                      </a:r>
+                    </a:p>
+                  </a:txBody>
+                  <a:tcPr/>
+                </a:tc>
+                <a:extLst>
+                  <a:ext uri="{0D108BD9-81ED-4DB2-BD59-A6C34878D82A}">
+                    <a16:rowId xmlns:a16="http://schemas.microsoft.com/office/drawing/2014/main" val="35691838"/>
+                  </a:ext>
+                </a:extLst>
+              </a:tr>
+            </a:tbl>
+          </a:graphicData>
+        </a:graphic>
+      </p:graphicFrame>
+      <p:sp>
+        <p:nvSpPr>
+          <p:cNvPr id="11" name="TextBox 10">
+            <a:extLst>
+              <a:ext uri="{FF2B5EF4-FFF2-40B4-BE49-F238E27FC236}">
+                <a16:creationId xmlns:a16="http://schemas.microsoft.com/office/drawing/2014/main" id="{513C47D9-212B-4E48-823B-0C6E3621585F}"/>
+              </a:ext>
+            </a:extLst>
+          </p:cNvPr>
+          <p:cNvSpPr txBox="1"/>
+          <p:nvPr/>
+        </p:nvSpPr>
+        <p:spPr>
+          <a:xfrm>
+            <a:off x="6096000" y="4191158"/>
+            <a:ext cx="5511800" cy="2031325"/>
+          </a:xfrm>
+          <a:prstGeom prst="rect">
+            <a:avLst/>
+          </a:prstGeom>
+          <a:noFill/>
+        </p:spPr>
+        <p:txBody>
+          <a:bodyPr wrap="square" rtlCol="0">
+            <a:spAutoFit/>
+          </a:bodyPr>
+          <a:lstStyle/>
+          <a:p>
+            <a:pPr marL="285750" indent="-285750">
+              <a:buFont typeface="Arial" panose="020B0604020202020204" pitchFamily="34" charset="0"/>
+              <a:buChar char="•"/>
+            </a:pPr>
+            <a:r>
+              <a:rPr lang="en-IN" dirty="0"/>
+              <a:t>Based on no of investments done as well we see Venture FT is the best</a:t>
+            </a:r>
+          </a:p>
+          <a:p>
+            <a:pPr marL="285750" indent="-285750">
+              <a:buFont typeface="Arial" panose="020B0604020202020204" pitchFamily="34" charset="0"/>
+              <a:buChar char="•"/>
+            </a:pPr>
+            <a:r>
+              <a:rPr lang="en-IN" b="1" dirty="0"/>
+              <a:t>Note</a:t>
+            </a:r>
+            <a:r>
+              <a:rPr lang="en-IN" dirty="0"/>
+              <a:t>: These values were analysed from Dataset which includes records below 5M and above 15M</a:t>
+            </a:r>
+          </a:p>
+          <a:p>
+            <a:pPr marL="285750" indent="-285750">
+              <a:buFont typeface="Arial" panose="020B0604020202020204" pitchFamily="34" charset="0"/>
+              <a:buChar char="•"/>
+            </a:pPr>
+            <a:r>
+              <a:rPr lang="en-IN" dirty="0"/>
+              <a:t>There are 47809 records left after keeping only venture type data</a:t>
+            </a:r>
+          </a:p>
+          <a:p>
+            <a:pPr marL="285750" indent="-285750">
+              <a:buFont typeface="Arial" panose="020B0604020202020204" pitchFamily="34" charset="0"/>
+              <a:buChar char="•"/>
+            </a:pPr>
+            <a:endParaRPr lang="en-IN" dirty="0"/>
           </a:p>
         </p:txBody>
       </p:sp>
@@ -3970,36 +6095,459 @@
           <a:p>
             <a:r>
               <a:rPr lang="en-IN" b="1" dirty="0"/>
-              <a:t> </a:t>
-            </a:r>
-            <a:r>
-              <a:rPr lang="en-IN" sz="2800" dirty="0"/>
-              <a:t>&lt;Analysis&gt;</a:t>
-            </a:r>
-          </a:p>
-        </p:txBody>
-      </p:sp>
-      <p:sp>
-        <p:nvSpPr>
-          <p:cNvPr id="3" name="Content Placeholder 2"/>
-          <p:cNvSpPr>
-            <a:spLocks noGrp="1"/>
-          </p:cNvSpPr>
+              <a:t>Country Analysis</a:t>
+            </a:r>
+            <a:endParaRPr lang="en-IN" sz="2800" dirty="0"/>
+          </a:p>
+        </p:txBody>
+      </p:sp>
+      <p:graphicFrame>
+        <p:nvGraphicFramePr>
+          <p:cNvPr id="5" name="Table 5">
+            <a:extLst>
+              <a:ext uri="{FF2B5EF4-FFF2-40B4-BE49-F238E27FC236}">
+                <a16:creationId xmlns:a16="http://schemas.microsoft.com/office/drawing/2014/main" id="{88ACE525-FC69-40E5-9DC0-DB8588F0A472}"/>
+              </a:ext>
+            </a:extLst>
+          </p:cNvPr>
+          <p:cNvGraphicFramePr>
+            <a:graphicFrameLocks noGrp="1"/>
+          </p:cNvGraphicFramePr>
           <p:nvPr>
             <p:ph idx="1"/>
-          </p:nvPr>
-        </p:nvSpPr>
-        <p:spPr/>
-        <p:txBody>
-          <a:bodyPr>
-            <a:normAutofit/>
+            <p:extLst>
+              <p:ext uri="{D42A27DB-BD31-4B8C-83A1-F6EECF244321}">
+                <p14:modId xmlns:p14="http://schemas.microsoft.com/office/powerpoint/2010/main" val="4276596762"/>
+              </p:ext>
+            </p:extLst>
+          </p:nvPr>
+        </p:nvGraphicFramePr>
+        <p:xfrm>
+          <a:off x="511175" y="2159000"/>
+          <a:ext cx="5267326" cy="3657600"/>
+        </p:xfrm>
+        <a:graphic>
+          <a:graphicData uri="http://schemas.openxmlformats.org/drawingml/2006/table">
+            <a:tbl>
+              <a:tblPr firstRow="1" bandRow="1">
+                <a:tableStyleId>{5C22544A-7EE6-4342-B048-85BDC9FD1C3A}</a:tableStyleId>
+              </a:tblPr>
+              <a:tblGrid>
+                <a:gridCol w="2633663">
+                  <a:extLst>
+                    <a:ext uri="{9D8B030D-6E8A-4147-A177-3AD203B41FA5}">
+                      <a16:colId xmlns:a16="http://schemas.microsoft.com/office/drawing/2014/main" val="778723403"/>
+                    </a:ext>
+                  </a:extLst>
+                </a:gridCol>
+                <a:gridCol w="2633663">
+                  <a:extLst>
+                    <a:ext uri="{9D8B030D-6E8A-4147-A177-3AD203B41FA5}">
+                      <a16:colId xmlns:a16="http://schemas.microsoft.com/office/drawing/2014/main" val="2850721723"/>
+                    </a:ext>
+                  </a:extLst>
+                </a:gridCol>
+              </a:tblGrid>
+              <a:tr h="254000">
+                <a:tc>
+                  <a:txBody>
+                    <a:bodyPr/>
+                    <a:lstStyle/>
+                    <a:p>
+                      <a:r>
+                        <a:rPr lang="en-IN" dirty="0"/>
+                        <a:t>Country Code</a:t>
+                      </a:r>
+                    </a:p>
+                  </a:txBody>
+                  <a:tcPr/>
+                </a:tc>
+                <a:tc>
+                  <a:txBody>
+                    <a:bodyPr/>
+                    <a:lstStyle/>
+                    <a:p>
+                      <a:r>
+                        <a:rPr lang="en-IN" dirty="0"/>
+                        <a:t>Funded Amount Sum</a:t>
+                      </a:r>
+                    </a:p>
+                  </a:txBody>
+                  <a:tcPr/>
+                </a:tc>
+                <a:extLst>
+                  <a:ext uri="{0D108BD9-81ED-4DB2-BD59-A6C34878D82A}">
+                    <a16:rowId xmlns:a16="http://schemas.microsoft.com/office/drawing/2014/main" val="3481820837"/>
+                  </a:ext>
+                </a:extLst>
+              </a:tr>
+              <a:tr h="254000">
+                <a:tc>
+                  <a:txBody>
+                    <a:bodyPr/>
+                    <a:lstStyle/>
+                    <a:p>
+                      <a:r>
+                        <a:rPr lang="en-IN" dirty="0"/>
+                        <a:t>USA</a:t>
+                      </a:r>
+                    </a:p>
+                  </a:txBody>
+                  <a:tcPr/>
+                </a:tc>
+                <a:tc>
+                  <a:txBody>
+                    <a:bodyPr/>
+                    <a:lstStyle/>
+                    <a:p>
+                      <a:r>
+                        <a:rPr lang="en-IN" dirty="0"/>
+                        <a:t>420068029342.000</a:t>
+                      </a:r>
+                    </a:p>
+                  </a:txBody>
+                  <a:tcPr/>
+                </a:tc>
+                <a:extLst>
+                  <a:ext uri="{0D108BD9-81ED-4DB2-BD59-A6C34878D82A}">
+                    <a16:rowId xmlns:a16="http://schemas.microsoft.com/office/drawing/2014/main" val="1747300897"/>
+                  </a:ext>
+                </a:extLst>
+              </a:tr>
+              <a:tr h="254000">
+                <a:tc>
+                  <a:txBody>
+                    <a:bodyPr/>
+                    <a:lstStyle/>
+                    <a:p>
+                      <a:r>
+                        <a:rPr lang="en-IN" dirty="0"/>
+                        <a:t>CHN</a:t>
+                      </a:r>
+                    </a:p>
+                  </a:txBody>
+                  <a:tcPr/>
+                </a:tc>
+                <a:tc>
+                  <a:txBody>
+                    <a:bodyPr/>
+                    <a:lstStyle/>
+                    <a:p>
+                      <a:r>
+                        <a:rPr lang="en-IN" dirty="0"/>
+                        <a:t>39338918773.000</a:t>
+                      </a:r>
+                    </a:p>
+                  </a:txBody>
+                  <a:tcPr/>
+                </a:tc>
+                <a:extLst>
+                  <a:ext uri="{0D108BD9-81ED-4DB2-BD59-A6C34878D82A}">
+                    <a16:rowId xmlns:a16="http://schemas.microsoft.com/office/drawing/2014/main" val="1807811013"/>
+                  </a:ext>
+                </a:extLst>
+              </a:tr>
+              <a:tr h="254000">
+                <a:tc>
+                  <a:txBody>
+                    <a:bodyPr/>
+                    <a:lstStyle/>
+                    <a:p>
+                      <a:r>
+                        <a:rPr lang="en-IN" dirty="0"/>
+                        <a:t>GBR </a:t>
+                      </a:r>
+                    </a:p>
+                  </a:txBody>
+                  <a:tcPr/>
+                </a:tc>
+                <a:tc>
+                  <a:txBody>
+                    <a:bodyPr/>
+                    <a:lstStyle/>
+                    <a:p>
+                      <a:r>
+                        <a:rPr lang="en-IN" dirty="0"/>
+                        <a:t>20072813004.000</a:t>
+                      </a:r>
+                    </a:p>
+                  </a:txBody>
+                  <a:tcPr/>
+                </a:tc>
+                <a:extLst>
+                  <a:ext uri="{0D108BD9-81ED-4DB2-BD59-A6C34878D82A}">
+                    <a16:rowId xmlns:a16="http://schemas.microsoft.com/office/drawing/2014/main" val="3152201790"/>
+                  </a:ext>
+                </a:extLst>
+              </a:tr>
+              <a:tr h="254000">
+                <a:tc>
+                  <a:txBody>
+                    <a:bodyPr/>
+                    <a:lstStyle/>
+                    <a:p>
+                      <a:r>
+                        <a:rPr lang="en-IN" dirty="0"/>
+                        <a:t>IND</a:t>
+                      </a:r>
+                    </a:p>
+                  </a:txBody>
+                  <a:tcPr/>
+                </a:tc>
+                <a:tc>
+                  <a:txBody>
+                    <a:bodyPr/>
+                    <a:lstStyle/>
+                    <a:p>
+                      <a:r>
+                        <a:rPr lang="en-IN" dirty="0"/>
+                        <a:t>14261508718.000</a:t>
+                      </a:r>
+                    </a:p>
+                  </a:txBody>
+                  <a:tcPr/>
+                </a:tc>
+                <a:extLst>
+                  <a:ext uri="{0D108BD9-81ED-4DB2-BD59-A6C34878D82A}">
+                    <a16:rowId xmlns:a16="http://schemas.microsoft.com/office/drawing/2014/main" val="403388027"/>
+                  </a:ext>
+                </a:extLst>
+              </a:tr>
+              <a:tr h="254000">
+                <a:tc>
+                  <a:txBody>
+                    <a:bodyPr/>
+                    <a:lstStyle/>
+                    <a:p>
+                      <a:r>
+                        <a:rPr lang="en-IN" dirty="0"/>
+                        <a:t>CAN</a:t>
+                      </a:r>
+                    </a:p>
+                  </a:txBody>
+                  <a:tcPr/>
+                </a:tc>
+                <a:tc>
+                  <a:txBody>
+                    <a:bodyPr/>
+                    <a:lstStyle/>
+                    <a:p>
+                      <a:r>
+                        <a:rPr lang="en-IN" dirty="0"/>
+                        <a:t>9482217668.000</a:t>
+                      </a:r>
+                    </a:p>
+                  </a:txBody>
+                  <a:tcPr/>
+                </a:tc>
+                <a:extLst>
+                  <a:ext uri="{0D108BD9-81ED-4DB2-BD59-A6C34878D82A}">
+                    <a16:rowId xmlns:a16="http://schemas.microsoft.com/office/drawing/2014/main" val="2193799107"/>
+                  </a:ext>
+                </a:extLst>
+              </a:tr>
+              <a:tr h="254000">
+                <a:tc>
+                  <a:txBody>
+                    <a:bodyPr/>
+                    <a:lstStyle/>
+                    <a:p>
+                      <a:r>
+                        <a:rPr lang="en-IN" dirty="0"/>
+                        <a:t>FRA </a:t>
+                      </a:r>
+                    </a:p>
+                  </a:txBody>
+                  <a:tcPr/>
+                </a:tc>
+                <a:tc>
+                  <a:txBody>
+                    <a:bodyPr/>
+                    <a:lstStyle/>
+                    <a:p>
+                      <a:r>
+                        <a:rPr lang="en-IN" dirty="0"/>
+                        <a:t>7226851352.000</a:t>
+                      </a:r>
+                    </a:p>
+                  </a:txBody>
+                  <a:tcPr/>
+                </a:tc>
+                <a:extLst>
+                  <a:ext uri="{0D108BD9-81ED-4DB2-BD59-A6C34878D82A}">
+                    <a16:rowId xmlns:a16="http://schemas.microsoft.com/office/drawing/2014/main" val="3859440009"/>
+                  </a:ext>
+                </a:extLst>
+              </a:tr>
+              <a:tr h="254000">
+                <a:tc>
+                  <a:txBody>
+                    <a:bodyPr/>
+                    <a:lstStyle/>
+                    <a:p>
+                      <a:r>
+                        <a:rPr lang="en-IN" dirty="0"/>
+                        <a:t>ISR </a:t>
+                      </a:r>
+                    </a:p>
+                  </a:txBody>
+                  <a:tcPr/>
+                </a:tc>
+                <a:tc>
+                  <a:txBody>
+                    <a:bodyPr/>
+                    <a:lstStyle/>
+                    <a:p>
+                      <a:r>
+                        <a:rPr lang="en-IN" dirty="0"/>
+                        <a:t>6854350477.000</a:t>
+                      </a:r>
+                    </a:p>
+                  </a:txBody>
+                  <a:tcPr/>
+                </a:tc>
+                <a:extLst>
+                  <a:ext uri="{0D108BD9-81ED-4DB2-BD59-A6C34878D82A}">
+                    <a16:rowId xmlns:a16="http://schemas.microsoft.com/office/drawing/2014/main" val="2156208996"/>
+                  </a:ext>
+                </a:extLst>
+              </a:tr>
+              <a:tr h="254000">
+                <a:tc>
+                  <a:txBody>
+                    <a:bodyPr/>
+                    <a:lstStyle/>
+                    <a:p>
+                      <a:r>
+                        <a:rPr lang="en-IN" dirty="0"/>
+                        <a:t>DEU </a:t>
+                      </a:r>
+                    </a:p>
+                  </a:txBody>
+                  <a:tcPr/>
+                </a:tc>
+                <a:tc>
+                  <a:txBody>
+                    <a:bodyPr/>
+                    <a:lstStyle/>
+                    <a:p>
+                      <a:r>
+                        <a:rPr lang="en-IN" dirty="0"/>
+                        <a:t>6306921981.000</a:t>
+                      </a:r>
+                    </a:p>
+                  </a:txBody>
+                  <a:tcPr/>
+                </a:tc>
+                <a:extLst>
+                  <a:ext uri="{0D108BD9-81ED-4DB2-BD59-A6C34878D82A}">
+                    <a16:rowId xmlns:a16="http://schemas.microsoft.com/office/drawing/2014/main" val="3153052021"/>
+                  </a:ext>
+                </a:extLst>
+              </a:tr>
+              <a:tr h="254000">
+                <a:tc>
+                  <a:txBody>
+                    <a:bodyPr/>
+                    <a:lstStyle/>
+                    <a:p>
+                      <a:r>
+                        <a:rPr lang="en-IN" dirty="0"/>
+                        <a:t>JPN </a:t>
+                      </a:r>
+                    </a:p>
+                  </a:txBody>
+                  <a:tcPr/>
+                </a:tc>
+                <a:tc>
+                  <a:txBody>
+                    <a:bodyPr/>
+                    <a:lstStyle/>
+                    <a:p>
+                      <a:r>
+                        <a:rPr lang="en-IN" dirty="0"/>
+                        <a:t>3167647127.000</a:t>
+                      </a:r>
+                    </a:p>
+                  </a:txBody>
+                  <a:tcPr/>
+                </a:tc>
+                <a:extLst>
+                  <a:ext uri="{0D108BD9-81ED-4DB2-BD59-A6C34878D82A}">
+                    <a16:rowId xmlns:a16="http://schemas.microsoft.com/office/drawing/2014/main" val="1541304485"/>
+                  </a:ext>
+                </a:extLst>
+              </a:tr>
+            </a:tbl>
+          </a:graphicData>
+        </a:graphic>
+      </p:graphicFrame>
+      <p:sp>
+        <p:nvSpPr>
+          <p:cNvPr id="6" name="TextBox 5">
+            <a:extLst>
+              <a:ext uri="{FF2B5EF4-FFF2-40B4-BE49-F238E27FC236}">
+                <a16:creationId xmlns:a16="http://schemas.microsoft.com/office/drawing/2014/main" id="{19FEC6FF-AD4C-4F30-AD06-631A1CBBDA87}"/>
+              </a:ext>
+            </a:extLst>
+          </p:cNvPr>
+          <p:cNvSpPr txBox="1"/>
+          <p:nvPr/>
+        </p:nvSpPr>
+        <p:spPr>
+          <a:xfrm>
+            <a:off x="6273800" y="2972137"/>
+            <a:ext cx="5267326" cy="2031325"/>
+          </a:xfrm>
+          <a:prstGeom prst="rect">
+            <a:avLst/>
+          </a:prstGeom>
+          <a:noFill/>
+        </p:spPr>
+        <p:txBody>
+          <a:bodyPr wrap="square" rtlCol="0">
+            <a:spAutoFit/>
           </a:bodyPr>
           <a:lstStyle/>
           <a:p>
-            <a:pPr marL="0" indent="0">
-              <a:buNone/>
+            <a:pPr marL="285750" indent="-285750">
+              <a:buFont typeface="Arial" panose="020B0604020202020204" pitchFamily="34" charset="0"/>
+              <a:buChar char="•"/>
             </a:pPr>
-            <a:endParaRPr lang="en-IN" sz="1400" dirty="0"/>
+            <a:r>
+              <a:rPr lang="en-IN" dirty="0"/>
+              <a:t>Since Spark Funds wants to invest in countries which have most funded amount, we will analyse the top three countries </a:t>
+            </a:r>
+          </a:p>
+          <a:p>
+            <a:pPr marL="285750" indent="-285750">
+              <a:buFont typeface="Arial" panose="020B0604020202020204" pitchFamily="34" charset="0"/>
+              <a:buChar char="•"/>
+            </a:pPr>
+            <a:r>
+              <a:rPr lang="en-IN" dirty="0"/>
+              <a:t>English is not an official language in CHN</a:t>
+            </a:r>
+          </a:p>
+          <a:p>
+            <a:pPr marL="285750" indent="-285750">
+              <a:buFont typeface="Arial" panose="020B0604020202020204" pitchFamily="34" charset="0"/>
+              <a:buChar char="•"/>
+            </a:pPr>
+            <a:r>
+              <a:rPr lang="en-IN" dirty="0"/>
+              <a:t>So we focussed on USA,GBR and IND</a:t>
+            </a:r>
+          </a:p>
+          <a:p>
+            <a:pPr marL="285750" indent="-285750">
+              <a:buFont typeface="Arial" panose="020B0604020202020204" pitchFamily="34" charset="0"/>
+              <a:buChar char="•"/>
+            </a:pPr>
+            <a:r>
+              <a:rPr lang="en-IN" dirty="0"/>
+              <a:t>Based on count of investments USA is way too high in count compared to any other country.</a:t>
+            </a:r>
           </a:p>
         </p:txBody>
       </p:sp>
@@ -4035,7 +6583,36 @@
       </p:grpSpPr>
       <p:sp>
         <p:nvSpPr>
-          <p:cNvPr id="3" name="Content Placeholder 2"/>
+          <p:cNvPr id="2" name="Title 1"/>
+          <p:cNvSpPr>
+            <a:spLocks noGrp="1"/>
+          </p:cNvSpPr>
+          <p:nvPr>
+            <p:ph type="title"/>
+          </p:nvPr>
+        </p:nvSpPr>
+        <p:spPr/>
+        <p:txBody>
+          <a:bodyPr/>
+          <a:lstStyle/>
+          <a:p>
+            <a:r>
+              <a:rPr lang="en-IN" b="1" dirty="0"/>
+              <a:t>Sector Analysis</a:t>
+            </a:r>
+            <a:endParaRPr lang="en-IN" sz="2800" dirty="0"/>
+          </a:p>
+        </p:txBody>
+      </p:sp>
+      <p:sp>
+        <p:nvSpPr>
+          <p:cNvPr id="8" name="Content Placeholder 7">
+            <a:extLst>
+              <a:ext uri="{FF2B5EF4-FFF2-40B4-BE49-F238E27FC236}">
+                <a16:creationId xmlns:a16="http://schemas.microsoft.com/office/drawing/2014/main" id="{C2CCAF0F-12C5-4027-A262-E700ED272932}"/>
+              </a:ext>
+            </a:extLst>
+          </p:cNvPr>
           <p:cNvSpPr>
             <a:spLocks noGrp="1"/>
           </p:cNvSpPr>
@@ -4050,51 +6627,257 @@
           </a:bodyPr>
           <a:lstStyle/>
           <a:p>
-            <a:pPr marL="0" indent="0">
-              <a:buNone/>
-            </a:pPr>
-            <a:r>
-              <a:rPr lang="en-IN" sz="1800" dirty="0"/>
-              <a:t>Plot 1</a:t>
-            </a:r>
-          </a:p>
-        </p:txBody>
-      </p:sp>
-      <p:sp>
-        <p:nvSpPr>
-          <p:cNvPr id="6" name="Title 1"/>
-          <p:cNvSpPr>
-            <a:spLocks noGrp="1"/>
-          </p:cNvSpPr>
-          <p:nvPr>
-            <p:ph type="title"/>
-          </p:nvPr>
-        </p:nvSpPr>
-        <p:spPr>
-          <a:xfrm>
-            <a:off x="1136469" y="640080"/>
-            <a:ext cx="9313817" cy="856138"/>
-          </a:xfrm>
-        </p:spPr>
-        <p:txBody>
-          <a:bodyPr/>
-          <a:lstStyle/>
-          <a:p>
-            <a:r>
-              <a:rPr lang="en-IN" b="1" dirty="0"/>
-              <a:t> </a:t>
-            </a:r>
-            <a:r>
-              <a:rPr lang="en-IN" sz="2800" dirty="0"/>
-              <a:t>&lt;Results&gt;</a:t>
-            </a:r>
+            <a:r>
+              <a:rPr lang="en-IN" sz="1600" dirty="0"/>
+              <a:t>After extracting the primary sector we create a new derived variable called </a:t>
+            </a:r>
+            <a:r>
+              <a:rPr lang="en-IN" sz="1600" b="1" dirty="0" err="1"/>
+              <a:t>main_sector</a:t>
+            </a:r>
+            <a:r>
+              <a:rPr lang="en-IN" sz="1600" dirty="0"/>
+              <a:t> given a primary sector</a:t>
+            </a:r>
+          </a:p>
+          <a:p>
+            <a:r>
+              <a:rPr lang="en-IN" sz="1600" dirty="0"/>
+              <a:t>We observed that there are few missing mappings in the mappings.csv</a:t>
+            </a:r>
+          </a:p>
+          <a:p>
+            <a:pPr lvl="1"/>
+            <a:r>
+              <a:rPr lang="en-IN" sz="1600" dirty="0"/>
+              <a:t>Dropped all the rows which had primary sector NOT mapped to any main sector and being less than 100</a:t>
+            </a:r>
+          </a:p>
+          <a:p>
+            <a:pPr lvl="1"/>
+            <a:r>
+              <a:rPr lang="en-IN" sz="1600" dirty="0"/>
+              <a:t>For all the primary sectors with more than 100 records not having a mapping, we manually mapped them.</a:t>
+            </a:r>
+          </a:p>
+          <a:p>
+            <a:pPr lvl="1"/>
+            <a:r>
+              <a:rPr lang="en-IN" sz="1600" dirty="0" err="1"/>
+              <a:t>Eg</a:t>
+            </a:r>
+            <a:r>
+              <a:rPr lang="en-IN" sz="1600" dirty="0"/>
+              <a:t>: Analytics was one such primary sector which was not mapped to any main sector.</a:t>
+            </a:r>
+          </a:p>
+          <a:p>
+            <a:r>
+              <a:rPr lang="en-IN" sz="1600" dirty="0"/>
+              <a:t>After dropping the above records, we were only left with 41.1% of data</a:t>
+            </a:r>
+          </a:p>
+          <a:p>
+            <a:r>
+              <a:rPr lang="en-IN" sz="1600" dirty="0"/>
+              <a:t>Further created three </a:t>
+            </a:r>
+            <a:r>
+              <a:rPr lang="en-IN" sz="1600" dirty="0" err="1"/>
+              <a:t>dataframes</a:t>
+            </a:r>
+            <a:r>
+              <a:rPr lang="en-IN" sz="1600" dirty="0"/>
+              <a:t> with USA,GBR and IND and investment between 5M and 15M</a:t>
+            </a:r>
+          </a:p>
+          <a:p>
+            <a:r>
+              <a:rPr lang="en-IN" sz="1600" dirty="0"/>
+              <a:t>We did not observe more outliers in this range of 5M and 15M</a:t>
+            </a:r>
+          </a:p>
+          <a:p>
+            <a:r>
+              <a:rPr lang="en-IN" sz="1600" dirty="0"/>
+              <a:t>Based on Count - </a:t>
+            </a:r>
+          </a:p>
+          <a:p>
+            <a:pPr lvl="1"/>
+            <a:r>
+              <a:rPr lang="en-US" sz="1600" i="0" dirty="0">
+                <a:solidFill>
+                  <a:schemeClr val="accent6">
+                    <a:lumMod val="50000"/>
+                  </a:schemeClr>
+                </a:solidFill>
+                <a:effectLst/>
+              </a:rPr>
+              <a:t>Others, Social-Finance-Analytics-Advertising and </a:t>
+            </a:r>
+            <a:r>
+              <a:rPr lang="en-US" sz="1600" i="0" dirty="0" err="1">
+                <a:solidFill>
+                  <a:schemeClr val="accent6">
+                    <a:lumMod val="50000"/>
+                  </a:schemeClr>
+                </a:solidFill>
+                <a:effectLst/>
+              </a:rPr>
+              <a:t>CleanTech</a:t>
+            </a:r>
+            <a:r>
+              <a:rPr lang="en-US" sz="1600" i="0" dirty="0">
+                <a:solidFill>
+                  <a:schemeClr val="accent6">
+                    <a:lumMod val="50000"/>
+                  </a:schemeClr>
+                </a:solidFill>
+                <a:effectLst/>
+              </a:rPr>
+              <a:t>/</a:t>
+            </a:r>
+            <a:r>
+              <a:rPr lang="en-US" sz="1600" i="0" dirty="0" err="1">
+                <a:solidFill>
+                  <a:schemeClr val="accent6">
+                    <a:lumMod val="50000"/>
+                  </a:schemeClr>
+                </a:solidFill>
+                <a:effectLst/>
+              </a:rPr>
+              <a:t>SemiConductors</a:t>
+            </a:r>
+            <a:r>
+              <a:rPr lang="en-US" sz="1600" i="0" dirty="0">
+                <a:solidFill>
+                  <a:schemeClr val="accent6">
+                    <a:lumMod val="50000"/>
+                  </a:schemeClr>
+                </a:solidFill>
+                <a:effectLst/>
+              </a:rPr>
+              <a:t> </a:t>
+            </a:r>
+            <a:r>
+              <a:rPr lang="en-US" sz="1600" b="0" i="0" dirty="0">
+                <a:solidFill>
+                  <a:srgbClr val="000000"/>
+                </a:solidFill>
+                <a:effectLst/>
+              </a:rPr>
+              <a:t>are Top sectors in USA </a:t>
+            </a:r>
+          </a:p>
+          <a:p>
+            <a:pPr lvl="1"/>
+            <a:r>
+              <a:rPr lang="en-US" sz="1600" i="0" dirty="0">
+                <a:solidFill>
+                  <a:schemeClr val="accent6">
+                    <a:lumMod val="50000"/>
+                  </a:schemeClr>
+                </a:solidFill>
+                <a:effectLst/>
+              </a:rPr>
+              <a:t>Others, </a:t>
+            </a:r>
+            <a:r>
+              <a:rPr lang="en-US" sz="1600" i="0" dirty="0" err="1">
+                <a:solidFill>
+                  <a:schemeClr val="accent6">
+                    <a:lumMod val="50000"/>
+                  </a:schemeClr>
+                </a:solidFill>
+                <a:effectLst/>
+              </a:rPr>
+              <a:t>CleanTech</a:t>
+            </a:r>
+            <a:r>
+              <a:rPr lang="en-US" sz="1600" i="0" dirty="0">
+                <a:solidFill>
+                  <a:schemeClr val="accent6">
+                    <a:lumMod val="50000"/>
+                  </a:schemeClr>
+                </a:solidFill>
+                <a:effectLst/>
+              </a:rPr>
+              <a:t>/</a:t>
+            </a:r>
+            <a:r>
+              <a:rPr lang="en-US" sz="1600" i="0" dirty="0" err="1">
+                <a:solidFill>
+                  <a:schemeClr val="accent6">
+                    <a:lumMod val="50000"/>
+                  </a:schemeClr>
+                </a:solidFill>
+                <a:effectLst/>
+              </a:rPr>
+              <a:t>SemiConductors</a:t>
+            </a:r>
+            <a:r>
+              <a:rPr lang="en-US" sz="1600" i="0" dirty="0">
+                <a:solidFill>
+                  <a:schemeClr val="accent6">
+                    <a:lumMod val="50000"/>
+                  </a:schemeClr>
+                </a:solidFill>
+                <a:effectLst/>
+              </a:rPr>
+              <a:t> and Social-Finance-Analytics-Advertising</a:t>
+            </a:r>
+            <a:r>
+              <a:rPr lang="en-US" sz="1600" i="0" dirty="0">
+                <a:solidFill>
+                  <a:srgbClr val="000000"/>
+                </a:solidFill>
+                <a:effectLst/>
+              </a:rPr>
+              <a:t> </a:t>
+            </a:r>
+            <a:r>
+              <a:rPr lang="en-US" sz="1600" b="0" i="0" dirty="0">
+                <a:solidFill>
+                  <a:srgbClr val="000000"/>
+                </a:solidFill>
+                <a:effectLst/>
+              </a:rPr>
+              <a:t>are Top sectors in GBR(UK)</a:t>
+            </a:r>
+          </a:p>
+          <a:p>
+            <a:pPr lvl="1"/>
+            <a:r>
+              <a:rPr lang="en-US" sz="1600" b="0" i="0" dirty="0">
+                <a:solidFill>
+                  <a:schemeClr val="accent6">
+                    <a:lumMod val="50000"/>
+                  </a:schemeClr>
+                </a:solidFill>
+                <a:effectLst/>
+              </a:rPr>
+              <a:t>Others, Social-Finance-Analytics-Advertising and News-Search-Messaging</a:t>
+            </a:r>
+            <a:r>
+              <a:rPr lang="en-US" sz="1600" b="0" i="0" dirty="0">
+                <a:solidFill>
+                  <a:srgbClr val="000000"/>
+                </a:solidFill>
+                <a:effectLst/>
+              </a:rPr>
+              <a:t> are Top sectors in India</a:t>
+            </a:r>
+          </a:p>
+          <a:p>
+            <a:endParaRPr lang="en-IN" sz="1200" dirty="0"/>
           </a:p>
         </p:txBody>
       </p:sp>
     </p:spTree>
     <p:extLst>
       <p:ext uri="{BB962C8B-B14F-4D97-AF65-F5344CB8AC3E}">
-        <p14:creationId xmlns:p14="http://schemas.microsoft.com/office/powerpoint/2010/main" val="1739856806"/>
+        <p14:creationId xmlns:p14="http://schemas.microsoft.com/office/powerpoint/2010/main" val="4120506122"/>
       </p:ext>
     </p:extLst>
   </p:cSld>
@@ -4121,33 +6904,41 @@
           <a:chExt cx="0" cy="0"/>
         </a:xfrm>
       </p:grpSpPr>
-      <p:sp>
-        <p:nvSpPr>
-          <p:cNvPr id="3" name="Content Placeholder 2"/>
-          <p:cNvSpPr>
-            <a:spLocks noGrp="1"/>
-          </p:cNvSpPr>
+      <p:pic>
+        <p:nvPicPr>
+          <p:cNvPr id="4" name="Content Placeholder 3">
+            <a:extLst>
+              <a:ext uri="{FF2B5EF4-FFF2-40B4-BE49-F238E27FC236}">
+                <a16:creationId xmlns:a16="http://schemas.microsoft.com/office/drawing/2014/main" id="{8DCD7597-CCF0-4D6B-AF0D-CEDF29ECA57D}"/>
+              </a:ext>
+            </a:extLst>
+          </p:cNvPr>
+          <p:cNvPicPr>
+            <a:picLocks noGrp="1" noChangeAspect="1"/>
+          </p:cNvPicPr>
           <p:nvPr>
             <p:ph idx="1"/>
           </p:nvPr>
-        </p:nvSpPr>
-        <p:spPr/>
-        <p:txBody>
-          <a:bodyPr>
-            <a:normAutofit/>
-          </a:bodyPr>
-          <a:lstStyle/>
-          <a:p>
-            <a:pPr marL="0" indent="0">
-              <a:buNone/>
-            </a:pPr>
-            <a:r>
-              <a:rPr lang="en-IN" sz="1800" dirty="0"/>
-              <a:t>Plot 2</a:t>
-            </a:r>
-          </a:p>
-        </p:txBody>
-      </p:sp>
+        </p:nvPicPr>
+        <p:blipFill>
+          <a:blip r:embed="rId2">
+            <a:extLst>
+              <a:ext uri="{28A0092B-C50C-407E-A947-70E740481C1C}">
+                <a14:useLocalDpi xmlns:a14="http://schemas.microsoft.com/office/drawing/2010/main" val="0"/>
+              </a:ext>
+            </a:extLst>
+          </a:blip>
+          <a:stretch>
+            <a:fillRect/>
+          </a:stretch>
+        </p:blipFill>
+        <p:spPr>
+          <a:xfrm>
+            <a:off x="1674586" y="1639094"/>
+            <a:ext cx="8775700" cy="4882170"/>
+          </a:xfrm>
+        </p:spPr>
+      </p:pic>
       <p:sp>
         <p:nvSpPr>
           <p:cNvPr id="6" name="Title 1"/>
@@ -4170,19 +6961,16 @@
           <a:p>
             <a:r>
               <a:rPr lang="en-IN" b="1" dirty="0"/>
-              <a:t> </a:t>
-            </a:r>
-            <a:r>
-              <a:rPr lang="en-IN" sz="2800" dirty="0"/>
-              <a:t>&lt;Results&gt;</a:t>
-            </a:r>
+              <a:t>Funding Type with Representative Value</a:t>
+            </a:r>
+            <a:endParaRPr lang="en-IN" sz="2800" dirty="0"/>
           </a:p>
         </p:txBody>
       </p:sp>
     </p:spTree>
     <p:extLst>
       <p:ext uri="{BB962C8B-B14F-4D97-AF65-F5344CB8AC3E}">
-        <p14:creationId xmlns:p14="http://schemas.microsoft.com/office/powerpoint/2010/main" val="3733554285"/>
+        <p14:creationId xmlns:p14="http://schemas.microsoft.com/office/powerpoint/2010/main" val="1739856806"/>
       </p:ext>
     </p:extLst>
   </p:cSld>
@@ -4209,33 +6997,41 @@
           <a:chExt cx="0" cy="0"/>
         </a:xfrm>
       </p:grpSpPr>
-      <p:sp>
-        <p:nvSpPr>
-          <p:cNvPr id="3" name="Content Placeholder 2"/>
-          <p:cNvSpPr>
-            <a:spLocks noGrp="1"/>
-          </p:cNvSpPr>
+      <p:pic>
+        <p:nvPicPr>
+          <p:cNvPr id="4" name="Content Placeholder 3">
+            <a:extLst>
+              <a:ext uri="{FF2B5EF4-FFF2-40B4-BE49-F238E27FC236}">
+                <a16:creationId xmlns:a16="http://schemas.microsoft.com/office/drawing/2014/main" id="{3DCE66DC-8D92-464C-8E14-2082141D50A4}"/>
+              </a:ext>
+            </a:extLst>
+          </p:cNvPr>
+          <p:cNvPicPr>
+            <a:picLocks noGrp="1" noChangeAspect="1"/>
+          </p:cNvPicPr>
           <p:nvPr>
             <p:ph idx="1"/>
           </p:nvPr>
-        </p:nvSpPr>
-        <p:spPr/>
-        <p:txBody>
-          <a:bodyPr>
-            <a:normAutofit/>
-          </a:bodyPr>
-          <a:lstStyle/>
-          <a:p>
-            <a:pPr marL="0" indent="0">
-              <a:buNone/>
-            </a:pPr>
-            <a:r>
-              <a:rPr lang="en-IN" sz="1800" dirty="0"/>
-              <a:t>Plot 3</a:t>
-            </a:r>
-          </a:p>
-        </p:txBody>
-      </p:sp>
+        </p:nvPicPr>
+        <p:blipFill>
+          <a:blip r:embed="rId2">
+            <a:extLst>
+              <a:ext uri="{28A0092B-C50C-407E-A947-70E740481C1C}">
+                <a14:useLocalDpi xmlns:a14="http://schemas.microsoft.com/office/drawing/2010/main" val="0"/>
+              </a:ext>
+            </a:extLst>
+          </a:blip>
+          <a:stretch>
+            <a:fillRect/>
+          </a:stretch>
+        </p:blipFill>
+        <p:spPr>
+          <a:xfrm>
+            <a:off x="698500" y="1822958"/>
+            <a:ext cx="5641975" cy="4242086"/>
+          </a:xfrm>
+        </p:spPr>
+      </p:pic>
       <p:sp>
         <p:nvSpPr>
           <p:cNvPr id="6" name="Title 1"/>
@@ -4257,20 +7053,397 @@
           <a:lstStyle/>
           <a:p>
             <a:r>
-              <a:rPr lang="en-IN" b="1" dirty="0"/>
-              <a:t> </a:t>
-            </a:r>
-            <a:r>
-              <a:rPr lang="en-IN" sz="2800" dirty="0"/>
-              <a:t>&lt;Results&gt;</a:t>
-            </a:r>
-          </a:p>
-        </p:txBody>
-      </p:sp>
+              <a:rPr lang="en-US" sz="2800" dirty="0"/>
+              <a:t>Top 9 Countries based on Funding Sum</a:t>
+            </a:r>
+            <a:endParaRPr lang="en-IN" sz="2800" dirty="0"/>
+          </a:p>
+        </p:txBody>
+      </p:sp>
+      <p:graphicFrame>
+        <p:nvGraphicFramePr>
+          <p:cNvPr id="7" name="Table 5">
+            <a:extLst>
+              <a:ext uri="{FF2B5EF4-FFF2-40B4-BE49-F238E27FC236}">
+                <a16:creationId xmlns:a16="http://schemas.microsoft.com/office/drawing/2014/main" id="{E6A9C00E-874D-4E16-933E-FAAFC016CA8C}"/>
+              </a:ext>
+            </a:extLst>
+          </p:cNvPr>
+          <p:cNvGraphicFramePr>
+            <a:graphicFrameLocks/>
+          </p:cNvGraphicFramePr>
+          <p:nvPr>
+            <p:extLst>
+              <p:ext uri="{D42A27DB-BD31-4B8C-83A1-F6EECF244321}">
+                <p14:modId xmlns:p14="http://schemas.microsoft.com/office/powerpoint/2010/main" val="1261865193"/>
+              </p:ext>
+            </p:extLst>
+          </p:nvPr>
+        </p:nvGraphicFramePr>
+        <p:xfrm>
+          <a:off x="6505575" y="1822958"/>
+          <a:ext cx="5267326" cy="3657600"/>
+        </p:xfrm>
+        <a:graphic>
+          <a:graphicData uri="http://schemas.openxmlformats.org/drawingml/2006/table">
+            <a:tbl>
+              <a:tblPr firstRow="1" bandRow="1">
+                <a:tableStyleId>{5C22544A-7EE6-4342-B048-85BDC9FD1C3A}</a:tableStyleId>
+              </a:tblPr>
+              <a:tblGrid>
+                <a:gridCol w="2633663">
+                  <a:extLst>
+                    <a:ext uri="{9D8B030D-6E8A-4147-A177-3AD203B41FA5}">
+                      <a16:colId xmlns:a16="http://schemas.microsoft.com/office/drawing/2014/main" val="778723403"/>
+                    </a:ext>
+                  </a:extLst>
+                </a:gridCol>
+                <a:gridCol w="2633663">
+                  <a:extLst>
+                    <a:ext uri="{9D8B030D-6E8A-4147-A177-3AD203B41FA5}">
+                      <a16:colId xmlns:a16="http://schemas.microsoft.com/office/drawing/2014/main" val="2850721723"/>
+                    </a:ext>
+                  </a:extLst>
+                </a:gridCol>
+              </a:tblGrid>
+              <a:tr h="254000">
+                <a:tc>
+                  <a:txBody>
+                    <a:bodyPr/>
+                    <a:lstStyle/>
+                    <a:p>
+                      <a:r>
+                        <a:rPr lang="en-IN" dirty="0"/>
+                        <a:t>Country Code</a:t>
+                      </a:r>
+                    </a:p>
+                  </a:txBody>
+                  <a:tcPr/>
+                </a:tc>
+                <a:tc>
+                  <a:txBody>
+                    <a:bodyPr/>
+                    <a:lstStyle/>
+                    <a:p>
+                      <a:r>
+                        <a:rPr lang="en-IN" dirty="0"/>
+                        <a:t>Funded Amount Sum</a:t>
+                      </a:r>
+                    </a:p>
+                  </a:txBody>
+                  <a:tcPr/>
+                </a:tc>
+                <a:extLst>
+                  <a:ext uri="{0D108BD9-81ED-4DB2-BD59-A6C34878D82A}">
+                    <a16:rowId xmlns:a16="http://schemas.microsoft.com/office/drawing/2014/main" val="3481820837"/>
+                  </a:ext>
+                </a:extLst>
+              </a:tr>
+              <a:tr h="254000">
+                <a:tc>
+                  <a:txBody>
+                    <a:bodyPr/>
+                    <a:lstStyle/>
+                    <a:p>
+                      <a:r>
+                        <a:rPr lang="en-IN" dirty="0"/>
+                        <a:t>USA</a:t>
+                      </a:r>
+                    </a:p>
+                  </a:txBody>
+                  <a:tcPr/>
+                </a:tc>
+                <a:tc>
+                  <a:txBody>
+                    <a:bodyPr/>
+                    <a:lstStyle/>
+                    <a:p>
+                      <a:r>
+                        <a:rPr lang="en-IN" dirty="0"/>
+                        <a:t>420068029342.000</a:t>
+                      </a:r>
+                    </a:p>
+                  </a:txBody>
+                  <a:tcPr/>
+                </a:tc>
+                <a:extLst>
+                  <a:ext uri="{0D108BD9-81ED-4DB2-BD59-A6C34878D82A}">
+                    <a16:rowId xmlns:a16="http://schemas.microsoft.com/office/drawing/2014/main" val="1747300897"/>
+                  </a:ext>
+                </a:extLst>
+              </a:tr>
+              <a:tr h="254000">
+                <a:tc>
+                  <a:txBody>
+                    <a:bodyPr/>
+                    <a:lstStyle/>
+                    <a:p>
+                      <a:r>
+                        <a:rPr lang="en-IN" dirty="0"/>
+                        <a:t>CHN</a:t>
+                      </a:r>
+                    </a:p>
+                  </a:txBody>
+                  <a:tcPr/>
+                </a:tc>
+                <a:tc>
+                  <a:txBody>
+                    <a:bodyPr/>
+                    <a:lstStyle/>
+                    <a:p>
+                      <a:r>
+                        <a:rPr lang="en-IN" dirty="0"/>
+                        <a:t>39338918773.000</a:t>
+                      </a:r>
+                    </a:p>
+                  </a:txBody>
+                  <a:tcPr/>
+                </a:tc>
+                <a:extLst>
+                  <a:ext uri="{0D108BD9-81ED-4DB2-BD59-A6C34878D82A}">
+                    <a16:rowId xmlns:a16="http://schemas.microsoft.com/office/drawing/2014/main" val="1807811013"/>
+                  </a:ext>
+                </a:extLst>
+              </a:tr>
+              <a:tr h="254000">
+                <a:tc>
+                  <a:txBody>
+                    <a:bodyPr/>
+                    <a:lstStyle/>
+                    <a:p>
+                      <a:r>
+                        <a:rPr lang="en-IN" dirty="0"/>
+                        <a:t>GBR </a:t>
+                      </a:r>
+                    </a:p>
+                  </a:txBody>
+                  <a:tcPr/>
+                </a:tc>
+                <a:tc>
+                  <a:txBody>
+                    <a:bodyPr/>
+                    <a:lstStyle/>
+                    <a:p>
+                      <a:r>
+                        <a:rPr lang="en-IN" dirty="0"/>
+                        <a:t>20072813004.000</a:t>
+                      </a:r>
+                    </a:p>
+                  </a:txBody>
+                  <a:tcPr/>
+                </a:tc>
+                <a:extLst>
+                  <a:ext uri="{0D108BD9-81ED-4DB2-BD59-A6C34878D82A}">
+                    <a16:rowId xmlns:a16="http://schemas.microsoft.com/office/drawing/2014/main" val="3152201790"/>
+                  </a:ext>
+                </a:extLst>
+              </a:tr>
+              <a:tr h="254000">
+                <a:tc>
+                  <a:txBody>
+                    <a:bodyPr/>
+                    <a:lstStyle/>
+                    <a:p>
+                      <a:r>
+                        <a:rPr lang="en-IN" dirty="0"/>
+                        <a:t>IND</a:t>
+                      </a:r>
+                    </a:p>
+                  </a:txBody>
+                  <a:tcPr/>
+                </a:tc>
+                <a:tc>
+                  <a:txBody>
+                    <a:bodyPr/>
+                    <a:lstStyle/>
+                    <a:p>
+                      <a:r>
+                        <a:rPr lang="en-IN" dirty="0"/>
+                        <a:t>14261508718.000</a:t>
+                      </a:r>
+                    </a:p>
+                  </a:txBody>
+                  <a:tcPr/>
+                </a:tc>
+                <a:extLst>
+                  <a:ext uri="{0D108BD9-81ED-4DB2-BD59-A6C34878D82A}">
+                    <a16:rowId xmlns:a16="http://schemas.microsoft.com/office/drawing/2014/main" val="403388027"/>
+                  </a:ext>
+                </a:extLst>
+              </a:tr>
+              <a:tr h="254000">
+                <a:tc>
+                  <a:txBody>
+                    <a:bodyPr/>
+                    <a:lstStyle/>
+                    <a:p>
+                      <a:r>
+                        <a:rPr lang="en-IN" dirty="0"/>
+                        <a:t>CAN</a:t>
+                      </a:r>
+                    </a:p>
+                  </a:txBody>
+                  <a:tcPr/>
+                </a:tc>
+                <a:tc>
+                  <a:txBody>
+                    <a:bodyPr/>
+                    <a:lstStyle/>
+                    <a:p>
+                      <a:r>
+                        <a:rPr lang="en-IN" dirty="0"/>
+                        <a:t>9482217668.000</a:t>
+                      </a:r>
+                    </a:p>
+                  </a:txBody>
+                  <a:tcPr/>
+                </a:tc>
+                <a:extLst>
+                  <a:ext uri="{0D108BD9-81ED-4DB2-BD59-A6C34878D82A}">
+                    <a16:rowId xmlns:a16="http://schemas.microsoft.com/office/drawing/2014/main" val="2193799107"/>
+                  </a:ext>
+                </a:extLst>
+              </a:tr>
+              <a:tr h="254000">
+                <a:tc>
+                  <a:txBody>
+                    <a:bodyPr/>
+                    <a:lstStyle/>
+                    <a:p>
+                      <a:r>
+                        <a:rPr lang="en-IN" dirty="0"/>
+                        <a:t>FRA </a:t>
+                      </a:r>
+                    </a:p>
+                  </a:txBody>
+                  <a:tcPr/>
+                </a:tc>
+                <a:tc>
+                  <a:txBody>
+                    <a:bodyPr/>
+                    <a:lstStyle/>
+                    <a:p>
+                      <a:r>
+                        <a:rPr lang="en-IN" dirty="0"/>
+                        <a:t>7226851352.000</a:t>
+                      </a:r>
+                    </a:p>
+                  </a:txBody>
+                  <a:tcPr/>
+                </a:tc>
+                <a:extLst>
+                  <a:ext uri="{0D108BD9-81ED-4DB2-BD59-A6C34878D82A}">
+                    <a16:rowId xmlns:a16="http://schemas.microsoft.com/office/drawing/2014/main" val="3859440009"/>
+                  </a:ext>
+                </a:extLst>
+              </a:tr>
+              <a:tr h="254000">
+                <a:tc>
+                  <a:txBody>
+                    <a:bodyPr/>
+                    <a:lstStyle/>
+                    <a:p>
+                      <a:r>
+                        <a:rPr lang="en-IN" dirty="0"/>
+                        <a:t>ISR </a:t>
+                      </a:r>
+                    </a:p>
+                  </a:txBody>
+                  <a:tcPr/>
+                </a:tc>
+                <a:tc>
+                  <a:txBody>
+                    <a:bodyPr/>
+                    <a:lstStyle/>
+                    <a:p>
+                      <a:r>
+                        <a:rPr lang="en-IN" dirty="0"/>
+                        <a:t>6854350477.000</a:t>
+                      </a:r>
+                    </a:p>
+                  </a:txBody>
+                  <a:tcPr/>
+                </a:tc>
+                <a:extLst>
+                  <a:ext uri="{0D108BD9-81ED-4DB2-BD59-A6C34878D82A}">
+                    <a16:rowId xmlns:a16="http://schemas.microsoft.com/office/drawing/2014/main" val="2156208996"/>
+                  </a:ext>
+                </a:extLst>
+              </a:tr>
+              <a:tr h="254000">
+                <a:tc>
+                  <a:txBody>
+                    <a:bodyPr/>
+                    <a:lstStyle/>
+                    <a:p>
+                      <a:r>
+                        <a:rPr lang="en-IN" dirty="0"/>
+                        <a:t>DEU </a:t>
+                      </a:r>
+                    </a:p>
+                  </a:txBody>
+                  <a:tcPr/>
+                </a:tc>
+                <a:tc>
+                  <a:txBody>
+                    <a:bodyPr/>
+                    <a:lstStyle/>
+                    <a:p>
+                      <a:r>
+                        <a:rPr lang="en-IN" dirty="0"/>
+                        <a:t>6306921981.000</a:t>
+                      </a:r>
+                    </a:p>
+                  </a:txBody>
+                  <a:tcPr/>
+                </a:tc>
+                <a:extLst>
+                  <a:ext uri="{0D108BD9-81ED-4DB2-BD59-A6C34878D82A}">
+                    <a16:rowId xmlns:a16="http://schemas.microsoft.com/office/drawing/2014/main" val="3153052021"/>
+                  </a:ext>
+                </a:extLst>
+              </a:tr>
+              <a:tr h="254000">
+                <a:tc>
+                  <a:txBody>
+                    <a:bodyPr/>
+                    <a:lstStyle/>
+                    <a:p>
+                      <a:r>
+                        <a:rPr lang="en-IN" dirty="0"/>
+                        <a:t>JPN </a:t>
+                      </a:r>
+                    </a:p>
+                  </a:txBody>
+                  <a:tcPr/>
+                </a:tc>
+                <a:tc>
+                  <a:txBody>
+                    <a:bodyPr/>
+                    <a:lstStyle/>
+                    <a:p>
+                      <a:r>
+                        <a:rPr lang="en-IN" dirty="0"/>
+                        <a:t>3167647127.000</a:t>
+                      </a:r>
+                    </a:p>
+                  </a:txBody>
+                  <a:tcPr/>
+                </a:tc>
+                <a:extLst>
+                  <a:ext uri="{0D108BD9-81ED-4DB2-BD59-A6C34878D82A}">
+                    <a16:rowId xmlns:a16="http://schemas.microsoft.com/office/drawing/2014/main" val="1541304485"/>
+                  </a:ext>
+                </a:extLst>
+              </a:tr>
+            </a:tbl>
+          </a:graphicData>
+        </a:graphic>
+      </p:graphicFrame>
     </p:spTree>
     <p:extLst>
       <p:ext uri="{BB962C8B-B14F-4D97-AF65-F5344CB8AC3E}">
-        <p14:creationId xmlns:p14="http://schemas.microsoft.com/office/powerpoint/2010/main" val="1057818561"/>
+        <p14:creationId xmlns:p14="http://schemas.microsoft.com/office/powerpoint/2010/main" val="3733554285"/>
       </p:ext>
     </p:extLst>
   </p:cSld>

</xml_diff>

<commit_message>
Final Version V1- Added the top companies in each sector with sum of funds received
</commit_message>
<xml_diff>
--- a/Data/INVEST.pptx
+++ b/Data/INVEST.pptx
@@ -210,7 +210,7 @@
           <a:p>
             <a:fld id="{2E309023-AF2B-4043-B228-F191CADC9BB1}" type="datetimeFigureOut">
               <a:rPr lang="en-IN" smtClean="0"/>
-              <a:t>10-04-2021</a:t>
+              <a:t>18-04-2021</a:t>
             </a:fld>
             <a:endParaRPr lang="en-IN"/>
           </a:p>
@@ -609,7 +609,7 @@
           <a:p>
             <a:fld id="{70C018FE-C8D6-4A9C-A702-41F1E0C1C452}" type="datetimeFigureOut">
               <a:rPr lang="en-IN" smtClean="0"/>
-              <a:t>10-04-2021</a:t>
+              <a:t>18-04-2021</a:t>
             </a:fld>
             <a:endParaRPr lang="en-IN"/>
           </a:p>
@@ -779,7 +779,7 @@
           <a:p>
             <a:fld id="{70C018FE-C8D6-4A9C-A702-41F1E0C1C452}" type="datetimeFigureOut">
               <a:rPr lang="en-IN" smtClean="0"/>
-              <a:t>10-04-2021</a:t>
+              <a:t>18-04-2021</a:t>
             </a:fld>
             <a:endParaRPr lang="en-IN"/>
           </a:p>
@@ -959,7 +959,7 @@
           <a:p>
             <a:fld id="{70C018FE-C8D6-4A9C-A702-41F1E0C1C452}" type="datetimeFigureOut">
               <a:rPr lang="en-IN" smtClean="0"/>
-              <a:t>10-04-2021</a:t>
+              <a:t>18-04-2021</a:t>
             </a:fld>
             <a:endParaRPr lang="en-IN"/>
           </a:p>
@@ -1391,7 +1391,7 @@
           <a:p>
             <a:fld id="{70C018FE-C8D6-4A9C-A702-41F1E0C1C452}" type="datetimeFigureOut">
               <a:rPr lang="en-IN" smtClean="0"/>
-              <a:t>10-04-2021</a:t>
+              <a:t>18-04-2021</a:t>
             </a:fld>
             <a:endParaRPr lang="en-IN"/>
           </a:p>
@@ -1623,7 +1623,7 @@
           <a:p>
             <a:fld id="{70C018FE-C8D6-4A9C-A702-41F1E0C1C452}" type="datetimeFigureOut">
               <a:rPr lang="en-IN" smtClean="0"/>
-              <a:t>10-04-2021</a:t>
+              <a:t>18-04-2021</a:t>
             </a:fld>
             <a:endParaRPr lang="en-IN"/>
           </a:p>
@@ -1990,7 +1990,7 @@
           <a:p>
             <a:fld id="{70C018FE-C8D6-4A9C-A702-41F1E0C1C452}" type="datetimeFigureOut">
               <a:rPr lang="en-IN" smtClean="0"/>
-              <a:t>10-04-2021</a:t>
+              <a:t>18-04-2021</a:t>
             </a:fld>
             <a:endParaRPr lang="en-IN"/>
           </a:p>
@@ -2108,7 +2108,7 @@
           <a:p>
             <a:fld id="{70C018FE-C8D6-4A9C-A702-41F1E0C1C452}" type="datetimeFigureOut">
               <a:rPr lang="en-IN" smtClean="0"/>
-              <a:t>10-04-2021</a:t>
+              <a:t>18-04-2021</a:t>
             </a:fld>
             <a:endParaRPr lang="en-IN"/>
           </a:p>
@@ -2203,7 +2203,7 @@
           <a:p>
             <a:fld id="{70C018FE-C8D6-4A9C-A702-41F1E0C1C452}" type="datetimeFigureOut">
               <a:rPr lang="en-IN" smtClean="0"/>
-              <a:t>10-04-2021</a:t>
+              <a:t>18-04-2021</a:t>
             </a:fld>
             <a:endParaRPr lang="en-IN"/>
           </a:p>
@@ -2479,7 +2479,7 @@
           <a:p>
             <a:fld id="{70C018FE-C8D6-4A9C-A702-41F1E0C1C452}" type="datetimeFigureOut">
               <a:rPr lang="en-IN" smtClean="0"/>
-              <a:t>10-04-2021</a:t>
+              <a:t>18-04-2021</a:t>
             </a:fld>
             <a:endParaRPr lang="en-IN"/>
           </a:p>
@@ -2736,7 +2736,7 @@
           <a:p>
             <a:fld id="{70C018FE-C8D6-4A9C-A702-41F1E0C1C452}" type="datetimeFigureOut">
               <a:rPr lang="en-IN" smtClean="0"/>
-              <a:t>10-04-2021</a:t>
+              <a:t>18-04-2021</a:t>
             </a:fld>
             <a:endParaRPr lang="en-IN"/>
           </a:p>
@@ -2947,7 +2947,7 @@
           <a:p>
             <a:fld id="{70C018FE-C8D6-4A9C-A702-41F1E0C1C452}" type="datetimeFigureOut">
               <a:rPr lang="en-IN" smtClean="0"/>
-              <a:t>10-04-2021</a:t>
+              <a:t>18-04-2021</a:t>
             </a:fld>
             <a:endParaRPr lang="en-IN" dirty="0"/>
           </a:p>
@@ -3662,25 +3662,7 @@
                 </a:solidFill>
                 <a:effectLst/>
               </a:rPr>
-              <a:t>There are more than one companies </a:t>
-            </a:r>
-            <a:r>
-              <a:rPr lang="en-US" b="0" i="0" dirty="0" err="1">
-                <a:solidFill>
-                  <a:srgbClr val="000000"/>
-                </a:solidFill>
-                <a:effectLst/>
-              </a:rPr>
-              <a:t>recieving</a:t>
-            </a:r>
-            <a:r>
-              <a:rPr lang="en-US" b="0" i="0" dirty="0">
-                <a:solidFill>
-                  <a:srgbClr val="000000"/>
-                </a:solidFill>
-                <a:effectLst/>
-              </a:rPr>
-              <a:t> the top fund in USA , GBR and IND under the top sector and the second top sector</a:t>
+              <a:t>There are more than one companies receiving the top fund in USA , GBR and IND under the top sector and the second top sector</a:t>
             </a:r>
           </a:p>
           <a:p>
@@ -3924,7 +3906,16 @@
             </a:r>
           </a:p>
           <a:p>
-            <a:pPr lvl="2"/>
+            <a:pPr lvl="1"/>
+            <a:r>
+              <a:rPr lang="en-US" sz="2900" b="1" i="0" dirty="0" err="1">
+                <a:solidFill>
+                  <a:srgbClr val="000000"/>
+                </a:solidFill>
+                <a:effectLst/>
+              </a:rPr>
+              <a:t>ShotsPotter</a:t>
+            </a:r>
             <a:r>
               <a:rPr lang="en-US" sz="2900" b="0" i="0" dirty="0">
                 <a:solidFill>
@@ -3932,11 +3923,20 @@
                 </a:solidFill>
                 <a:effectLst/>
               </a:rPr>
-              <a:t>There are 188 companies in which SparkFunds can invest in this particular Sector.</a:t>
-            </a:r>
-          </a:p>
-          <a:p>
-            <a:pPr lvl="2"/>
+              <a:t> is the highest fund receiving company in USA under Social-Finance-Analytics-Advertising with the total sum of 67.93M dollars</a:t>
+            </a:r>
+          </a:p>
+          <a:p>
+            <a:pPr lvl="1"/>
+            <a:r>
+              <a:rPr lang="en-US" sz="2900" b="1" i="0" dirty="0" err="1">
+                <a:solidFill>
+                  <a:srgbClr val="000000"/>
+                </a:solidFill>
+                <a:effectLst/>
+              </a:rPr>
+              <a:t>VirtuStream</a:t>
+            </a:r>
             <a:r>
               <a:rPr lang="en-US" sz="2900" b="0" i="0" dirty="0">
                 <a:solidFill>
@@ -3944,11 +3944,11 @@
                 </a:solidFill>
                 <a:effectLst/>
               </a:rPr>
-              <a:t>Since we have used the ranges 5M to 15M as inclusive , we are seeing more than 1 company receiving the highest fund</a:t>
-            </a:r>
-          </a:p>
-          <a:p>
-            <a:pPr lvl="2"/>
+              <a:t> is the highest fund receiving company in USA under Others Category with the total sum of 64.3M dollars.</a:t>
+            </a:r>
+          </a:p>
+          <a:p>
+            <a:pPr lvl="1"/>
             <a:r>
               <a:rPr lang="en-US" sz="2900" b="0" i="0" dirty="0">
                 <a:solidFill>
@@ -3956,16 +3956,7 @@
                 </a:solidFill>
                 <a:effectLst/>
               </a:rPr>
-              <a:t>Outlier removal wasn't necessary due to given reasons before where the budget cap itself helped us eliminate most of them</a:t>
-            </a:r>
-            <a:r>
-              <a:rPr lang="en-US" sz="2300" b="0" i="0" dirty="0">
-                <a:solidFill>
-                  <a:srgbClr val="000000"/>
-                </a:solidFill>
-                <a:effectLst/>
-              </a:rPr>
-              <a:t>.</a:t>
+              <a:t>Both the companies are close by in terms of investment.</a:t>
             </a:r>
           </a:p>
         </p:txBody>

</xml_diff>

<commit_message>
changed the second top in GBR
</commit_message>
<xml_diff>
--- a/Data/INVEST.pptx
+++ b/Data/INVEST.pptx
@@ -210,7 +210,7 @@
           <a:p>
             <a:fld id="{2E309023-AF2B-4043-B228-F191CADC9BB1}" type="datetimeFigureOut">
               <a:rPr lang="en-IN" smtClean="0"/>
-              <a:t>18-04-2021</a:t>
+              <a:t>24-04-2021</a:t>
             </a:fld>
             <a:endParaRPr lang="en-IN"/>
           </a:p>
@@ -609,7 +609,7 @@
           <a:p>
             <a:fld id="{70C018FE-C8D6-4A9C-A702-41F1E0C1C452}" type="datetimeFigureOut">
               <a:rPr lang="en-IN" smtClean="0"/>
-              <a:t>18-04-2021</a:t>
+              <a:t>24-04-2021</a:t>
             </a:fld>
             <a:endParaRPr lang="en-IN"/>
           </a:p>
@@ -779,7 +779,7 @@
           <a:p>
             <a:fld id="{70C018FE-C8D6-4A9C-A702-41F1E0C1C452}" type="datetimeFigureOut">
               <a:rPr lang="en-IN" smtClean="0"/>
-              <a:t>18-04-2021</a:t>
+              <a:t>24-04-2021</a:t>
             </a:fld>
             <a:endParaRPr lang="en-IN"/>
           </a:p>
@@ -959,7 +959,7 @@
           <a:p>
             <a:fld id="{70C018FE-C8D6-4A9C-A702-41F1E0C1C452}" type="datetimeFigureOut">
               <a:rPr lang="en-IN" smtClean="0"/>
-              <a:t>18-04-2021</a:t>
+              <a:t>24-04-2021</a:t>
             </a:fld>
             <a:endParaRPr lang="en-IN"/>
           </a:p>
@@ -1391,7 +1391,7 @@
           <a:p>
             <a:fld id="{70C018FE-C8D6-4A9C-A702-41F1E0C1C452}" type="datetimeFigureOut">
               <a:rPr lang="en-IN" smtClean="0"/>
-              <a:t>18-04-2021</a:t>
+              <a:t>24-04-2021</a:t>
             </a:fld>
             <a:endParaRPr lang="en-IN"/>
           </a:p>
@@ -1623,7 +1623,7 @@
           <a:p>
             <a:fld id="{70C018FE-C8D6-4A9C-A702-41F1E0C1C452}" type="datetimeFigureOut">
               <a:rPr lang="en-IN" smtClean="0"/>
-              <a:t>18-04-2021</a:t>
+              <a:t>24-04-2021</a:t>
             </a:fld>
             <a:endParaRPr lang="en-IN"/>
           </a:p>
@@ -1990,7 +1990,7 @@
           <a:p>
             <a:fld id="{70C018FE-C8D6-4A9C-A702-41F1E0C1C452}" type="datetimeFigureOut">
               <a:rPr lang="en-IN" smtClean="0"/>
-              <a:t>18-04-2021</a:t>
+              <a:t>24-04-2021</a:t>
             </a:fld>
             <a:endParaRPr lang="en-IN"/>
           </a:p>
@@ -2108,7 +2108,7 @@
           <a:p>
             <a:fld id="{70C018FE-C8D6-4A9C-A702-41F1E0C1C452}" type="datetimeFigureOut">
               <a:rPr lang="en-IN" smtClean="0"/>
-              <a:t>18-04-2021</a:t>
+              <a:t>24-04-2021</a:t>
             </a:fld>
             <a:endParaRPr lang="en-IN"/>
           </a:p>
@@ -2203,7 +2203,7 @@
           <a:p>
             <a:fld id="{70C018FE-C8D6-4A9C-A702-41F1E0C1C452}" type="datetimeFigureOut">
               <a:rPr lang="en-IN" smtClean="0"/>
-              <a:t>18-04-2021</a:t>
+              <a:t>24-04-2021</a:t>
             </a:fld>
             <a:endParaRPr lang="en-IN"/>
           </a:p>
@@ -2479,7 +2479,7 @@
           <a:p>
             <a:fld id="{70C018FE-C8D6-4A9C-A702-41F1E0C1C452}" type="datetimeFigureOut">
               <a:rPr lang="en-IN" smtClean="0"/>
-              <a:t>18-04-2021</a:t>
+              <a:t>24-04-2021</a:t>
             </a:fld>
             <a:endParaRPr lang="en-IN"/>
           </a:p>
@@ -2736,7 +2736,7 @@
           <a:p>
             <a:fld id="{70C018FE-C8D6-4A9C-A702-41F1E0C1C452}" type="datetimeFigureOut">
               <a:rPr lang="en-IN" smtClean="0"/>
-              <a:t>18-04-2021</a:t>
+              <a:t>24-04-2021</a:t>
             </a:fld>
             <a:endParaRPr lang="en-IN"/>
           </a:p>
@@ -2947,7 +2947,7 @@
           <a:p>
             <a:fld id="{70C018FE-C8D6-4A9C-A702-41F1E0C1C452}" type="datetimeFigureOut">
               <a:rPr lang="en-IN" smtClean="0"/>
-              <a:t>18-04-2021</a:t>
+              <a:t>24-04-2021</a:t>
             </a:fld>
             <a:endParaRPr lang="en-IN" dirty="0"/>
           </a:p>
@@ -3536,12 +3536,40 @@
           <a:chExt cx="0" cy="0"/>
         </a:xfrm>
       </p:grpSpPr>
+      <p:sp>
+        <p:nvSpPr>
+          <p:cNvPr id="6" name="Title 1"/>
+          <p:cNvSpPr>
+            <a:spLocks noGrp="1"/>
+          </p:cNvSpPr>
+          <p:nvPr>
+            <p:ph type="title"/>
+          </p:nvPr>
+        </p:nvSpPr>
+        <p:spPr>
+          <a:xfrm>
+            <a:off x="1136469" y="640080"/>
+            <a:ext cx="9313817" cy="856138"/>
+          </a:xfrm>
+        </p:spPr>
+        <p:txBody>
+          <a:bodyPr/>
+          <a:lstStyle/>
+          <a:p>
+            <a:r>
+              <a:rPr lang="en-US" sz="2800" dirty="0"/>
+              <a:t>Sectors based on Counts in Top3 Countries</a:t>
+            </a:r>
+            <a:endParaRPr lang="en-IN" sz="2800" dirty="0"/>
+          </a:p>
+        </p:txBody>
+      </p:sp>
       <p:pic>
         <p:nvPicPr>
-          <p:cNvPr id="4" name="Content Placeholder 3">
+          <p:cNvPr id="7" name="Content Placeholder 6">
             <a:extLst>
               <a:ext uri="{FF2B5EF4-FFF2-40B4-BE49-F238E27FC236}">
-                <a16:creationId xmlns:a16="http://schemas.microsoft.com/office/drawing/2014/main" id="{156DA577-562B-407F-89DE-0B6A6D12CF0B}"/>
+                <a16:creationId xmlns:a16="http://schemas.microsoft.com/office/drawing/2014/main" id="{1FF7F0DF-58FC-4106-A913-A940BFE59524}"/>
               </a:ext>
             </a:extLst>
           </p:cNvPr>
@@ -3566,39 +3594,11 @@
         </p:blipFill>
         <p:spPr>
           <a:xfrm>
-            <a:off x="1542869" y="1304165"/>
-            <a:ext cx="8690117" cy="5337935"/>
+            <a:off x="1136469" y="1496218"/>
+            <a:ext cx="8985430" cy="5481558"/>
           </a:xfrm>
         </p:spPr>
       </p:pic>
-      <p:sp>
-        <p:nvSpPr>
-          <p:cNvPr id="6" name="Title 1"/>
-          <p:cNvSpPr>
-            <a:spLocks noGrp="1"/>
-          </p:cNvSpPr>
-          <p:nvPr>
-            <p:ph type="title"/>
-          </p:nvPr>
-        </p:nvSpPr>
-        <p:spPr>
-          <a:xfrm>
-            <a:off x="1136469" y="640080"/>
-            <a:ext cx="9313817" cy="856138"/>
-          </a:xfrm>
-        </p:spPr>
-        <p:txBody>
-          <a:bodyPr/>
-          <a:lstStyle/>
-          <a:p>
-            <a:r>
-              <a:rPr lang="en-US" sz="2800" dirty="0"/>
-              <a:t>Sectors based on Counts in Top3 Countries</a:t>
-            </a:r>
-            <a:endParaRPr lang="en-IN" sz="2800" dirty="0"/>
-          </a:p>
-        </p:txBody>
-      </p:sp>
     </p:spTree>
     <p:extLst>
       <p:ext uri="{BB962C8B-B14F-4D97-AF65-F5344CB8AC3E}">
@@ -3956,7 +3956,7 @@
                 </a:solidFill>
                 <a:effectLst/>
               </a:rPr>
-              <a:t>Both the companies are close by in terms of investment.</a:t>
+              <a:t>Both the companies are close by in terms of investment. </a:t>
             </a:r>
           </a:p>
         </p:txBody>
@@ -6772,7 +6772,7 @@
                 </a:solidFill>
                 <a:effectLst/>
               </a:rPr>
-              <a:t>Others, </a:t>
+              <a:t>Others, Social-Finance-Analytics-Advertising  and </a:t>
             </a:r>
             <a:r>
               <a:rPr lang="en-US" sz="1600" i="0" dirty="0" err="1">
@@ -6816,7 +6816,7 @@
                 </a:solidFill>
                 <a:effectLst/>
               </a:rPr>
-              <a:t> and Social-Finance-Analytics-Advertising</a:t>
+              <a:t> </a:t>
             </a:r>
             <a:r>
               <a:rPr lang="en-US" sz="1600" i="0" dirty="0">

</xml_diff>

<commit_message>
Final version without closed companies
</commit_message>
<xml_diff>
--- a/Data/INVEST.pptx
+++ b/Data/INVEST.pptx
@@ -3501,7 +3501,14 @@
             <a:pPr algn="l"/>
             <a:r>
               <a:rPr lang="en-IN" sz="1800" dirty="0"/>
-              <a:t>Name: Gadicherla Sameer </a:t>
+              <a:t>Name: Gadicherla Sameer</a:t>
+            </a:r>
+          </a:p>
+          <a:p>
+            <a:pPr algn="l"/>
+            <a:r>
+              <a:rPr lang="en-IN" sz="1800" dirty="0"/>
+              <a:t>Batch – March 31’ 2021 </a:t>
             </a:r>
           </a:p>
         </p:txBody>
@@ -3566,10 +3573,10 @@
       </p:sp>
       <p:pic>
         <p:nvPicPr>
-          <p:cNvPr id="7" name="Content Placeholder 6">
+          <p:cNvPr id="5" name="Content Placeholder 4">
             <a:extLst>
               <a:ext uri="{FF2B5EF4-FFF2-40B4-BE49-F238E27FC236}">
-                <a16:creationId xmlns:a16="http://schemas.microsoft.com/office/drawing/2014/main" id="{1FF7F0DF-58FC-4106-A913-A940BFE59524}"/>
+                <a16:creationId xmlns:a16="http://schemas.microsoft.com/office/drawing/2014/main" id="{0210A0CD-4149-48BC-B0A1-656BD714C9B0}"/>
               </a:ext>
             </a:extLst>
           </p:cNvPr>
@@ -3594,8 +3601,8 @@
         </p:blipFill>
         <p:spPr>
           <a:xfrm>
-            <a:off x="1136469" y="1496218"/>
-            <a:ext cx="8985430" cy="5481558"/>
+            <a:off x="955314" y="1496218"/>
+            <a:ext cx="9561360" cy="5283694"/>
           </a:xfrm>
         </p:spPr>
       </p:pic>
@@ -3839,7 +3846,7 @@
                 </a:solidFill>
                 <a:effectLst/>
               </a:rPr>
-              <a:t>2658</a:t>
+              <a:t>2535</a:t>
             </a:r>
             <a:r>
               <a:rPr lang="en-US" b="0" i="0" dirty="0">
@@ -3848,25 +3855,7 @@
                 </a:solidFill>
                 <a:effectLst/>
               </a:rPr>
-              <a:t> </a:t>
-            </a:r>
-            <a:r>
-              <a:rPr lang="en-US" b="0" i="0" dirty="0" err="1">
-                <a:solidFill>
-                  <a:srgbClr val="000000"/>
-                </a:solidFill>
-                <a:effectLst/>
-              </a:rPr>
-              <a:t>investements</a:t>
-            </a:r>
-            <a:r>
-              <a:rPr lang="en-US" b="0" i="0" dirty="0">
-                <a:solidFill>
-                  <a:srgbClr val="000000"/>
-                </a:solidFill>
-                <a:effectLst/>
-              </a:rPr>
-              <a:t> are done here which are close to </a:t>
+              <a:t> investments are done here which are close to </a:t>
             </a:r>
             <a:r>
               <a:rPr lang="en-US" b="1" i="0" dirty="0">
@@ -3875,7 +3864,7 @@
                 </a:solidFill>
                 <a:effectLst/>
               </a:rPr>
-              <a:t>2923</a:t>
+              <a:t>2732</a:t>
             </a:r>
             <a:r>
               <a:rPr lang="en-US" b="0" i="0" dirty="0">
@@ -5351,8 +5340,14 @@
           </a:p>
           <a:p>
             <a:r>
+              <a:rPr lang="en-US" sz="1800" dirty="0"/>
+              <a:t>Dropped around 8720 rows which had rounds happening on closed companies.</a:t>
+            </a:r>
+          </a:p>
+          <a:p>
+            <a:r>
               <a:rPr lang="en-IN" sz="1800" dirty="0"/>
-              <a:t>There are 17%(~20K records) approx. missing values in the </a:t>
+              <a:t>There are 17.246%(~18.3K records) approx. missing values in the </a:t>
             </a:r>
             <a:r>
               <a:rPr lang="en-IN" sz="1800" dirty="0" err="1"/>
@@ -5366,13 +5361,13 @@
           <a:p>
             <a:r>
               <a:rPr lang="en-IN" sz="1800" dirty="0"/>
-              <a:t>There are around 6%(5.8K records) missing the country code. </a:t>
+              <a:t>There are around 5.263%(4.26K records) missing the country code. </a:t>
             </a:r>
           </a:p>
           <a:p>
             <a:r>
               <a:rPr lang="en-IN" sz="1800" dirty="0"/>
-              <a:t>There are around 580 records which are missing the primary sector field. </a:t>
+              <a:t>There are around 431 records which are missing the primary sector field. </a:t>
             </a:r>
           </a:p>
           <a:p>
@@ -5390,7 +5385,7 @@
           <a:p>
             <a:r>
               <a:rPr lang="en-IN" sz="1800" dirty="0"/>
-              <a:t>39818 records (34.65%) were dropped out of 114,949.</a:t>
+              <a:t>44780 records (38.95%) were dropped out of 114,942.</a:t>
             </a:r>
           </a:p>
         </p:txBody>
@@ -5464,7 +5459,7 @@
             <p:ph idx="1"/>
             <p:extLst>
               <p:ext uri="{D42A27DB-BD31-4B8C-83A1-F6EECF244321}">
-                <p14:modId xmlns:p14="http://schemas.microsoft.com/office/powerpoint/2010/main" val="1405927564"/>
+                <p14:modId xmlns:p14="http://schemas.microsoft.com/office/powerpoint/2010/main" val="1885998991"/>
               </p:ext>
             </p:extLst>
           </p:nvPr>
@@ -5549,7 +5544,7 @@
                     <a:p>
                       <a:r>
                         <a:rPr lang="en-IN" dirty="0"/>
-                        <a:t>300000 USD</a:t>
+                        <a:t>313837 USD</a:t>
                       </a:r>
                     </a:p>
                   </a:txBody>
@@ -5582,7 +5577,7 @@
                     <a:p>
                       <a:r>
                         <a:rPr lang="en-IN" dirty="0"/>
-                        <a:t>414906 USD</a:t>
+                        <a:t>418856 USD</a:t>
                       </a:r>
                     </a:p>
                   </a:txBody>
@@ -5660,7 +5655,7 @@
                     <a:p>
                       <a:r>
                         <a:rPr lang="en-IN" dirty="0"/>
-                        <a:t>20M USD</a:t>
+                        <a:t>21M USD</a:t>
                       </a:r>
                     </a:p>
                   </a:txBody>
@@ -5757,7 +5752,7 @@
           <p:nvPr>
             <p:extLst>
               <p:ext uri="{D42A27DB-BD31-4B8C-83A1-F6EECF244321}">
-                <p14:modId xmlns:p14="http://schemas.microsoft.com/office/powerpoint/2010/main" val="4213048479"/>
+                <p14:modId xmlns:p14="http://schemas.microsoft.com/office/powerpoint/2010/main" val="2787690244"/>
               </p:ext>
             </p:extLst>
           </p:nvPr>
@@ -5842,7 +5837,7 @@
                     <a:p>
                       <a:r>
                         <a:rPr lang="en-IN" dirty="0"/>
-                        <a:t>21095</a:t>
+                        <a:t>19731</a:t>
                       </a:r>
                     </a:p>
                   </a:txBody>
@@ -5875,7 +5870,7 @@
                     <a:p>
                       <a:r>
                         <a:rPr lang="en-IN" dirty="0"/>
-                        <a:t>4400</a:t>
+                        <a:t>3960</a:t>
                       </a:r>
                     </a:p>
                   </a:txBody>
@@ -5913,15 +5908,16 @@
                     <a:lstStyle/>
                     <a:p>
                       <a:r>
-                        <a:rPr lang="en-IN" dirty="0">
-                          <a:solidFill>
-                            <a:schemeClr val="accent6">
-                              <a:lumMod val="50000"/>
-                            </a:schemeClr>
-                          </a:solidFill>
-                        </a:rPr>
-                        <a:t>47809</a:t>
+                        <a:rPr lang="en-IN" dirty="0"/>
+                        <a:t>44748</a:t>
                       </a:r>
+                      <a:endParaRPr lang="en-IN" dirty="0">
+                        <a:solidFill>
+                          <a:schemeClr val="accent6">
+                            <a:lumMod val="50000"/>
+                          </a:schemeClr>
+                        </a:solidFill>
+                      </a:endParaRPr>
                     </a:p>
                   </a:txBody>
                   <a:tcPr/>
@@ -5953,7 +5949,7 @@
                     <a:p>
                       <a:r>
                         <a:rPr lang="en-IN" dirty="0"/>
-                        <a:t>1820</a:t>
+                        <a:t>1723</a:t>
                       </a:r>
                     </a:p>
                   </a:txBody>
@@ -6017,7 +6013,7 @@
             </a:r>
             <a:r>
               <a:rPr lang="en-IN" dirty="0"/>
-              <a:t>: These values were analysed from Dataset which includes records below 5M and above 15M</a:t>
+              <a:t>: These values were analysed from Dataset which includes records below 5M and above 15M as well</a:t>
             </a:r>
           </a:p>
           <a:p>
@@ -6027,7 +6023,7 @@
             </a:pPr>
             <a:r>
               <a:rPr lang="en-IN" dirty="0"/>
-              <a:t>There are 47809 records left after keeping only venture type data</a:t>
+              <a:t>There are 44748 records left after keeping only venture type data</a:t>
             </a:r>
           </a:p>
           <a:p>
@@ -6108,7 +6104,7 @@
             <p:ph idx="1"/>
             <p:extLst>
               <p:ext uri="{D42A27DB-BD31-4B8C-83A1-F6EECF244321}">
-                <p14:modId xmlns:p14="http://schemas.microsoft.com/office/powerpoint/2010/main" val="4276596762"/>
+                <p14:modId xmlns:p14="http://schemas.microsoft.com/office/powerpoint/2010/main" val="2927449620"/>
               </p:ext>
             </p:extLst>
           </p:nvPr>
@@ -6193,7 +6189,7 @@
                     <a:p>
                       <a:r>
                         <a:rPr lang="en-IN" dirty="0"/>
-                        <a:t>420068029342.000</a:t>
+                        <a:t>398324586390.000</a:t>
                       </a:r>
                     </a:p>
                   </a:txBody>
@@ -6226,7 +6222,7 @@
                     <a:p>
                       <a:r>
                         <a:rPr lang="en-IN" dirty="0"/>
-                        <a:t>39338918773.000</a:t>
+                        <a:t>38642273502.000</a:t>
                       </a:r>
                     </a:p>
                   </a:txBody>
@@ -6259,7 +6255,7 @@
                     <a:p>
                       <a:r>
                         <a:rPr lang="en-IN" dirty="0"/>
-                        <a:t>20072813004.000</a:t>
+                        <a:t>18142285645.000</a:t>
                       </a:r>
                     </a:p>
                   </a:txBody>
@@ -6292,7 +6288,7 @@
                     <a:p>
                       <a:r>
                         <a:rPr lang="en-IN" dirty="0"/>
-                        <a:t>14261508718.000</a:t>
+                        <a:t>13920253718.000</a:t>
                       </a:r>
                     </a:p>
                   </a:txBody>
@@ -6325,7 +6321,7 @@
                     <a:p>
                       <a:r>
                         <a:rPr lang="en-IN" dirty="0"/>
-                        <a:t>9482217668.000</a:t>
+                        <a:t>8747167598.000</a:t>
                       </a:r>
                     </a:p>
                   </a:txBody>
@@ -6358,7 +6354,7 @@
                     <a:p>
                       <a:r>
                         <a:rPr lang="en-IN" dirty="0"/>
-                        <a:t>7226851352.000</a:t>
+                        <a:t>6742608637.000</a:t>
                       </a:r>
                     </a:p>
                   </a:txBody>
@@ -6391,7 +6387,7 @@
                     <a:p>
                       <a:r>
                         <a:rPr lang="en-IN" dirty="0"/>
-                        <a:t>6854350477.000</a:t>
+                        <a:t>6484356814.000</a:t>
                       </a:r>
                     </a:p>
                   </a:txBody>
@@ -6424,7 +6420,7 @@
                     <a:p>
                       <a:r>
                         <a:rPr lang="en-IN" dirty="0"/>
-                        <a:t>6306921981.000</a:t>
+                        <a:t>6021103078.000</a:t>
                       </a:r>
                     </a:p>
                   </a:txBody>
@@ -6457,7 +6453,7 @@
                     <a:p>
                       <a:r>
                         <a:rPr lang="en-IN" dirty="0"/>
-                        <a:t>3167647127.000</a:t>
+                        <a:t>3156202471.000</a:t>
                       </a:r>
                     </a:p>
                   </a:txBody>
@@ -6665,7 +6661,7 @@
           <a:p>
             <a:r>
               <a:rPr lang="en-IN" sz="1600" dirty="0"/>
-              <a:t>After dropping the above records, we were only left with 41.1% of data</a:t>
+              <a:t>After dropping the above records, we were only left with 38.54% of data</a:t>
             </a:r>
           </a:p>
           <a:p>
@@ -6895,12 +6891,40 @@
           <a:chExt cx="0" cy="0"/>
         </a:xfrm>
       </p:grpSpPr>
+      <p:sp>
+        <p:nvSpPr>
+          <p:cNvPr id="6" name="Title 1"/>
+          <p:cNvSpPr>
+            <a:spLocks noGrp="1"/>
+          </p:cNvSpPr>
+          <p:nvPr>
+            <p:ph type="title"/>
+          </p:nvPr>
+        </p:nvSpPr>
+        <p:spPr>
+          <a:xfrm>
+            <a:off x="1136469" y="640080"/>
+            <a:ext cx="9313817" cy="856138"/>
+          </a:xfrm>
+        </p:spPr>
+        <p:txBody>
+          <a:bodyPr/>
+          <a:lstStyle/>
+          <a:p>
+            <a:r>
+              <a:rPr lang="en-IN" b="1" dirty="0"/>
+              <a:t>Funding Type with Representative Value</a:t>
+            </a:r>
+            <a:endParaRPr lang="en-IN" sz="2800" dirty="0"/>
+          </a:p>
+        </p:txBody>
+      </p:sp>
       <p:pic>
         <p:nvPicPr>
-          <p:cNvPr id="4" name="Content Placeholder 3">
+          <p:cNvPr id="7" name="Content Placeholder 6">
             <a:extLst>
               <a:ext uri="{FF2B5EF4-FFF2-40B4-BE49-F238E27FC236}">
-                <a16:creationId xmlns:a16="http://schemas.microsoft.com/office/drawing/2014/main" id="{8DCD7597-CCF0-4D6B-AF0D-CEDF29ECA57D}"/>
+                <a16:creationId xmlns:a16="http://schemas.microsoft.com/office/drawing/2014/main" id="{797DBE88-5E98-4492-A3E2-45187FC5C0C6}"/>
               </a:ext>
             </a:extLst>
           </p:cNvPr>
@@ -6925,39 +6949,11 @@
         </p:blipFill>
         <p:spPr>
           <a:xfrm>
-            <a:off x="1674586" y="1639094"/>
-            <a:ext cx="8775700" cy="4882170"/>
+            <a:off x="2272642" y="1761343"/>
+            <a:ext cx="7893360" cy="4284049"/>
           </a:xfrm>
         </p:spPr>
       </p:pic>
-      <p:sp>
-        <p:nvSpPr>
-          <p:cNvPr id="6" name="Title 1"/>
-          <p:cNvSpPr>
-            <a:spLocks noGrp="1"/>
-          </p:cNvSpPr>
-          <p:nvPr>
-            <p:ph type="title"/>
-          </p:nvPr>
-        </p:nvSpPr>
-        <p:spPr>
-          <a:xfrm>
-            <a:off x="1136469" y="640080"/>
-            <a:ext cx="9313817" cy="856138"/>
-          </a:xfrm>
-        </p:spPr>
-        <p:txBody>
-          <a:bodyPr/>
-          <a:lstStyle/>
-          <a:p>
-            <a:r>
-              <a:rPr lang="en-IN" b="1" dirty="0"/>
-              <a:t>Funding Type with Representative Value</a:t>
-            </a:r>
-            <a:endParaRPr lang="en-IN" sz="2800" dirty="0"/>
-          </a:p>
-        </p:txBody>
-      </p:sp>
     </p:spTree>
     <p:extLst>
       <p:ext uri="{BB962C8B-B14F-4D97-AF65-F5344CB8AC3E}">
@@ -6988,41 +6984,6 @@
           <a:chExt cx="0" cy="0"/>
         </a:xfrm>
       </p:grpSpPr>
-      <p:pic>
-        <p:nvPicPr>
-          <p:cNvPr id="4" name="Content Placeholder 3">
-            <a:extLst>
-              <a:ext uri="{FF2B5EF4-FFF2-40B4-BE49-F238E27FC236}">
-                <a16:creationId xmlns:a16="http://schemas.microsoft.com/office/drawing/2014/main" id="{3DCE66DC-8D92-464C-8E14-2082141D50A4}"/>
-              </a:ext>
-            </a:extLst>
-          </p:cNvPr>
-          <p:cNvPicPr>
-            <a:picLocks noGrp="1" noChangeAspect="1"/>
-          </p:cNvPicPr>
-          <p:nvPr>
-            <p:ph idx="1"/>
-          </p:nvPr>
-        </p:nvPicPr>
-        <p:blipFill>
-          <a:blip r:embed="rId2">
-            <a:extLst>
-              <a:ext uri="{28A0092B-C50C-407E-A947-70E740481C1C}">
-                <a14:useLocalDpi xmlns:a14="http://schemas.microsoft.com/office/drawing/2010/main" val="0"/>
-              </a:ext>
-            </a:extLst>
-          </a:blip>
-          <a:stretch>
-            <a:fillRect/>
-          </a:stretch>
-        </p:blipFill>
-        <p:spPr>
-          <a:xfrm>
-            <a:off x="698500" y="1822958"/>
-            <a:ext cx="5641975" cy="4242086"/>
-          </a:xfrm>
-        </p:spPr>
-      </p:pic>
       <p:sp>
         <p:nvSpPr>
           <p:cNvPr id="6" name="Title 1"/>
@@ -7066,7 +7027,7 @@
           <p:nvPr>
             <p:extLst>
               <p:ext uri="{D42A27DB-BD31-4B8C-83A1-F6EECF244321}">
-                <p14:modId xmlns:p14="http://schemas.microsoft.com/office/powerpoint/2010/main" val="1261865193"/>
+                <p14:modId xmlns:p14="http://schemas.microsoft.com/office/powerpoint/2010/main" val="876601049"/>
               </p:ext>
             </p:extLst>
           </p:nvPr>
@@ -7151,7 +7112,7 @@
                     <a:p>
                       <a:r>
                         <a:rPr lang="en-IN" dirty="0"/>
-                        <a:t>420068029342.000</a:t>
+                        <a:t>398324586390.000</a:t>
                       </a:r>
                     </a:p>
                   </a:txBody>
@@ -7184,7 +7145,7 @@
                     <a:p>
                       <a:r>
                         <a:rPr lang="en-IN" dirty="0"/>
-                        <a:t>39338918773.000</a:t>
+                        <a:t>38642273502.000</a:t>
                       </a:r>
                     </a:p>
                   </a:txBody>
@@ -7217,7 +7178,7 @@
                     <a:p>
                       <a:r>
                         <a:rPr lang="en-IN" dirty="0"/>
-                        <a:t>20072813004.000</a:t>
+                        <a:t>18142285645.000</a:t>
                       </a:r>
                     </a:p>
                   </a:txBody>
@@ -7250,7 +7211,7 @@
                     <a:p>
                       <a:r>
                         <a:rPr lang="en-IN" dirty="0"/>
-                        <a:t>14261508718.000</a:t>
+                        <a:t>13920253718.000</a:t>
                       </a:r>
                     </a:p>
                   </a:txBody>
@@ -7283,7 +7244,7 @@
                     <a:p>
                       <a:r>
                         <a:rPr lang="en-IN" dirty="0"/>
-                        <a:t>9482217668.000</a:t>
+                        <a:t>8747167598.000</a:t>
                       </a:r>
                     </a:p>
                   </a:txBody>
@@ -7316,7 +7277,7 @@
                     <a:p>
                       <a:r>
                         <a:rPr lang="en-IN" dirty="0"/>
-                        <a:t>7226851352.000</a:t>
+                        <a:t>6742608637.000</a:t>
                       </a:r>
                     </a:p>
                   </a:txBody>
@@ -7349,7 +7310,7 @@
                     <a:p>
                       <a:r>
                         <a:rPr lang="en-IN" dirty="0"/>
-                        <a:t>6854350477.000</a:t>
+                        <a:t>6484356814.000</a:t>
                       </a:r>
                     </a:p>
                   </a:txBody>
@@ -7382,7 +7343,7 @@
                     <a:p>
                       <a:r>
                         <a:rPr lang="en-IN" dirty="0"/>
-                        <a:t>6306921981.000</a:t>
+                        <a:t>6021103078.000</a:t>
                       </a:r>
                     </a:p>
                   </a:txBody>
@@ -7415,7 +7376,7 @@
                     <a:p>
                       <a:r>
                         <a:rPr lang="en-IN" dirty="0"/>
-                        <a:t>3167647127.000</a:t>
+                        <a:t>3156202471.000</a:t>
                       </a:r>
                     </a:p>
                   </a:txBody>
@@ -7431,6 +7392,41 @@
           </a:graphicData>
         </a:graphic>
       </p:graphicFrame>
+      <p:pic>
+        <p:nvPicPr>
+          <p:cNvPr id="8" name="Content Placeholder 7">
+            <a:extLst>
+              <a:ext uri="{FF2B5EF4-FFF2-40B4-BE49-F238E27FC236}">
+                <a16:creationId xmlns:a16="http://schemas.microsoft.com/office/drawing/2014/main" id="{BCDF49AF-0740-434F-9AA6-9A6ABBB0E6A1}"/>
+              </a:ext>
+            </a:extLst>
+          </p:cNvPr>
+          <p:cNvPicPr>
+            <a:picLocks noGrp="1" noChangeAspect="1"/>
+          </p:cNvPicPr>
+          <p:nvPr>
+            <p:ph idx="1"/>
+          </p:nvPr>
+        </p:nvPicPr>
+        <p:blipFill>
+          <a:blip r:embed="rId2">
+            <a:extLst>
+              <a:ext uri="{28A0092B-C50C-407E-A947-70E740481C1C}">
+                <a14:useLocalDpi xmlns:a14="http://schemas.microsoft.com/office/drawing/2010/main" val="0"/>
+              </a:ext>
+            </a:extLst>
+          </a:blip>
+          <a:stretch>
+            <a:fillRect/>
+          </a:stretch>
+        </p:blipFill>
+        <p:spPr>
+          <a:xfrm>
+            <a:off x="787461" y="1822958"/>
+            <a:ext cx="4898965" cy="3819558"/>
+          </a:xfrm>
+        </p:spPr>
+      </p:pic>
     </p:spTree>
     <p:extLst>
       <p:ext uri="{BB962C8B-B14F-4D97-AF65-F5344CB8AC3E}">

</xml_diff>